<commit_message>
Update for the paper
</commit_message>
<xml_diff>
--- a/app/Blink/images/floor plan.pptx
+++ b/app/Blink/images/floor plan.pptx
@@ -7,7 +7,8 @@
   <p:sldIdLst>
     <p:sldId id="258" r:id="rId2"/>
     <p:sldId id="260" r:id="rId3"/>
-    <p:sldId id="257" r:id="rId4"/>
+    <p:sldId id="263" r:id="rId4"/>
+    <p:sldId id="261" r:id="rId5"/>
   </p:sldIdLst>
   <p:sldSz cx="12192000" cy="6858000"/>
   <p:notesSz cx="6858000" cy="9144000"/>
@@ -245,7 +246,7 @@
           <a:p>
             <a:fld id="{B647E355-3975-4CF7-95F0-6047A6E6F5CF}" type="datetimeFigureOut">
               <a:rPr lang="en-US" smtClean="0"/>
-              <a:t>9/19/2019</a:t>
+              <a:t>9/24/2019</a:t>
             </a:fld>
             <a:endParaRPr lang="en-US"/>
           </a:p>
@@ -415,7 +416,7 @@
           <a:p>
             <a:fld id="{B647E355-3975-4CF7-95F0-6047A6E6F5CF}" type="datetimeFigureOut">
               <a:rPr lang="en-US" smtClean="0"/>
-              <a:t>9/19/2019</a:t>
+              <a:t>9/24/2019</a:t>
             </a:fld>
             <a:endParaRPr lang="en-US"/>
           </a:p>
@@ -595,7 +596,7 @@
           <a:p>
             <a:fld id="{B647E355-3975-4CF7-95F0-6047A6E6F5CF}" type="datetimeFigureOut">
               <a:rPr lang="en-US" smtClean="0"/>
-              <a:t>9/19/2019</a:t>
+              <a:t>9/24/2019</a:t>
             </a:fld>
             <a:endParaRPr lang="en-US"/>
           </a:p>
@@ -765,7 +766,7 @@
           <a:p>
             <a:fld id="{B647E355-3975-4CF7-95F0-6047A6E6F5CF}" type="datetimeFigureOut">
               <a:rPr lang="en-US" smtClean="0"/>
-              <a:t>9/19/2019</a:t>
+              <a:t>9/24/2019</a:t>
             </a:fld>
             <a:endParaRPr lang="en-US"/>
           </a:p>
@@ -1011,7 +1012,7 @@
           <a:p>
             <a:fld id="{B647E355-3975-4CF7-95F0-6047A6E6F5CF}" type="datetimeFigureOut">
               <a:rPr lang="en-US" smtClean="0"/>
-              <a:t>9/19/2019</a:t>
+              <a:t>9/24/2019</a:t>
             </a:fld>
             <a:endParaRPr lang="en-US"/>
           </a:p>
@@ -1243,7 +1244,7 @@
           <a:p>
             <a:fld id="{B647E355-3975-4CF7-95F0-6047A6E6F5CF}" type="datetimeFigureOut">
               <a:rPr lang="en-US" smtClean="0"/>
-              <a:t>9/19/2019</a:t>
+              <a:t>9/24/2019</a:t>
             </a:fld>
             <a:endParaRPr lang="en-US"/>
           </a:p>
@@ -1610,7 +1611,7 @@
           <a:p>
             <a:fld id="{B647E355-3975-4CF7-95F0-6047A6E6F5CF}" type="datetimeFigureOut">
               <a:rPr lang="en-US" smtClean="0"/>
-              <a:t>9/19/2019</a:t>
+              <a:t>9/24/2019</a:t>
             </a:fld>
             <a:endParaRPr lang="en-US"/>
           </a:p>
@@ -1728,7 +1729,7 @@
           <a:p>
             <a:fld id="{B647E355-3975-4CF7-95F0-6047A6E6F5CF}" type="datetimeFigureOut">
               <a:rPr lang="en-US" smtClean="0"/>
-              <a:t>9/19/2019</a:t>
+              <a:t>9/24/2019</a:t>
             </a:fld>
             <a:endParaRPr lang="en-US"/>
           </a:p>
@@ -1823,7 +1824,7 @@
           <a:p>
             <a:fld id="{B647E355-3975-4CF7-95F0-6047A6E6F5CF}" type="datetimeFigureOut">
               <a:rPr lang="en-US" smtClean="0"/>
-              <a:t>9/19/2019</a:t>
+              <a:t>9/24/2019</a:t>
             </a:fld>
             <a:endParaRPr lang="en-US"/>
           </a:p>
@@ -2100,7 +2101,7 @@
           <a:p>
             <a:fld id="{B647E355-3975-4CF7-95F0-6047A6E6F5CF}" type="datetimeFigureOut">
               <a:rPr lang="en-US" smtClean="0"/>
-              <a:t>9/19/2019</a:t>
+              <a:t>9/24/2019</a:t>
             </a:fld>
             <a:endParaRPr lang="en-US"/>
           </a:p>
@@ -2353,7 +2354,7 @@
           <a:p>
             <a:fld id="{B647E355-3975-4CF7-95F0-6047A6E6F5CF}" type="datetimeFigureOut">
               <a:rPr lang="en-US" smtClean="0"/>
-              <a:t>9/19/2019</a:t>
+              <a:t>9/24/2019</a:t>
             </a:fld>
             <a:endParaRPr lang="en-US"/>
           </a:p>
@@ -2566,7 +2567,7 @@
           <a:p>
             <a:fld id="{B647E355-3975-4CF7-95F0-6047A6E6F5CF}" type="datetimeFigureOut">
               <a:rPr lang="en-US" smtClean="0"/>
-              <a:t>9/19/2019</a:t>
+              <a:t>9/24/2019</a:t>
             </a:fld>
             <a:endParaRPr lang="en-US"/>
           </a:p>
@@ -6023,7 +6024,9 @@
           <a:noFill/>
           <a:ln w="28575">
             <a:solidFill>
-              <a:schemeClr val="tx1"/>
+              <a:schemeClr val="bg1">
+                <a:lumMod val="65000"/>
+              </a:schemeClr>
             </a:solidFill>
           </a:ln>
         </p:spPr>
@@ -6128,7 +6131,9 @@
           <a:noFill/>
           <a:ln w="38100">
             <a:solidFill>
-              <a:schemeClr val="tx1"/>
+              <a:schemeClr val="bg1">
+                <a:lumMod val="65000"/>
+              </a:schemeClr>
             </a:solidFill>
           </a:ln>
         </p:spPr>
@@ -6173,7 +6178,9 @@
           </a:prstGeom>
           <a:ln w="28575">
             <a:solidFill>
-              <a:schemeClr val="tx1"/>
+              <a:schemeClr val="bg1">
+                <a:lumMod val="65000"/>
+              </a:schemeClr>
             </a:solidFill>
           </a:ln>
         </p:spPr>
@@ -6208,7 +6215,9 @@
           </a:prstGeom>
           <a:ln w="28575">
             <a:solidFill>
-              <a:schemeClr val="tx1"/>
+              <a:schemeClr val="bg1">
+                <a:lumMod val="65000"/>
+              </a:schemeClr>
             </a:solidFill>
           </a:ln>
         </p:spPr>
@@ -6243,7 +6252,9 @@
           </a:prstGeom>
           <a:ln w="28575">
             <a:solidFill>
-              <a:schemeClr val="tx1"/>
+              <a:schemeClr val="bg1">
+                <a:lumMod val="65000"/>
+              </a:schemeClr>
             </a:solidFill>
           </a:ln>
         </p:spPr>
@@ -6278,7 +6289,9 @@
           </a:prstGeom>
           <a:ln w="28575">
             <a:solidFill>
-              <a:schemeClr val="tx1"/>
+              <a:schemeClr val="bg1">
+                <a:lumMod val="65000"/>
+              </a:schemeClr>
             </a:solidFill>
           </a:ln>
         </p:spPr>
@@ -6313,7 +6326,9 @@
           </a:prstGeom>
           <a:ln w="28575">
             <a:solidFill>
-              <a:schemeClr val="tx1"/>
+              <a:schemeClr val="bg1">
+                <a:lumMod val="65000"/>
+              </a:schemeClr>
             </a:solidFill>
           </a:ln>
         </p:spPr>
@@ -6348,7 +6363,9 @@
           </a:prstGeom>
           <a:ln w="28575">
             <a:solidFill>
-              <a:schemeClr val="tx1"/>
+              <a:schemeClr val="bg1">
+                <a:lumMod val="65000"/>
+              </a:schemeClr>
             </a:solidFill>
           </a:ln>
         </p:spPr>
@@ -6383,7 +6400,9 @@
           </a:prstGeom>
           <a:ln w="28575">
             <a:solidFill>
-              <a:schemeClr val="tx1"/>
+              <a:schemeClr val="bg1">
+                <a:lumMod val="65000"/>
+              </a:schemeClr>
             </a:solidFill>
           </a:ln>
         </p:spPr>
@@ -6418,7 +6437,9 @@
           </a:prstGeom>
           <a:ln w="28575">
             <a:solidFill>
-              <a:schemeClr val="tx1"/>
+              <a:schemeClr val="bg1">
+                <a:lumMod val="65000"/>
+              </a:schemeClr>
             </a:solidFill>
           </a:ln>
         </p:spPr>
@@ -6453,7 +6474,9 @@
           </a:prstGeom>
           <a:ln w="28575">
             <a:solidFill>
-              <a:schemeClr val="tx1"/>
+              <a:schemeClr val="bg1">
+                <a:lumMod val="65000"/>
+              </a:schemeClr>
             </a:solidFill>
           </a:ln>
         </p:spPr>
@@ -6488,7 +6511,9 @@
           </a:prstGeom>
           <a:ln w="28575">
             <a:solidFill>
-              <a:schemeClr val="tx1"/>
+              <a:schemeClr val="bg1">
+                <a:lumMod val="65000"/>
+              </a:schemeClr>
             </a:solidFill>
           </a:ln>
         </p:spPr>
@@ -6525,7 +6550,9 @@
           </a:prstGeom>
           <a:ln w="28575">
             <a:solidFill>
-              <a:schemeClr val="tx1"/>
+              <a:schemeClr val="bg1">
+                <a:lumMod val="65000"/>
+              </a:schemeClr>
             </a:solidFill>
           </a:ln>
         </p:spPr>
@@ -6560,7 +6587,9 @@
           </a:prstGeom>
           <a:ln w="28575">
             <a:solidFill>
-              <a:schemeClr val="tx1"/>
+              <a:schemeClr val="bg1">
+                <a:lumMod val="65000"/>
+              </a:schemeClr>
             </a:solidFill>
           </a:ln>
         </p:spPr>
@@ -6595,7 +6624,9 @@
           </a:prstGeom>
           <a:ln w="28575">
             <a:solidFill>
-              <a:schemeClr val="tx1"/>
+              <a:schemeClr val="bg1">
+                <a:lumMod val="65000"/>
+              </a:schemeClr>
             </a:solidFill>
           </a:ln>
         </p:spPr>
@@ -6632,7 +6663,9 @@
           </a:prstGeom>
           <a:ln w="28575">
             <a:solidFill>
-              <a:schemeClr val="tx1"/>
+              <a:schemeClr val="bg1">
+                <a:lumMod val="65000"/>
+              </a:schemeClr>
             </a:solidFill>
           </a:ln>
         </p:spPr>
@@ -6667,7 +6700,9 @@
           </a:prstGeom>
           <a:ln w="28575">
             <a:solidFill>
-              <a:schemeClr val="tx1"/>
+              <a:schemeClr val="bg1">
+                <a:lumMod val="65000"/>
+              </a:schemeClr>
             </a:solidFill>
           </a:ln>
         </p:spPr>
@@ -6702,7 +6737,9 @@
           </a:prstGeom>
           <a:ln w="28575">
             <a:solidFill>
-              <a:schemeClr val="tx1"/>
+              <a:schemeClr val="bg1">
+                <a:lumMod val="65000"/>
+              </a:schemeClr>
             </a:solidFill>
           </a:ln>
         </p:spPr>
@@ -6737,7 +6774,9 @@
           </a:prstGeom>
           <a:ln w="28575">
             <a:solidFill>
-              <a:schemeClr val="tx1"/>
+              <a:schemeClr val="bg1">
+                <a:lumMod val="65000"/>
+              </a:schemeClr>
             </a:solidFill>
           </a:ln>
         </p:spPr>
@@ -6772,7 +6811,9 @@
           </a:prstGeom>
           <a:ln w="28575">
             <a:solidFill>
-              <a:schemeClr val="tx1"/>
+              <a:schemeClr val="bg1">
+                <a:lumMod val="65000"/>
+              </a:schemeClr>
             </a:solidFill>
           </a:ln>
         </p:spPr>
@@ -6807,7 +6848,9 @@
           </a:prstGeom>
           <a:ln w="28575">
             <a:solidFill>
-              <a:schemeClr val="tx1"/>
+              <a:schemeClr val="bg1">
+                <a:lumMod val="65000"/>
+              </a:schemeClr>
             </a:solidFill>
           </a:ln>
         </p:spPr>
@@ -6842,7 +6885,9 @@
           </a:prstGeom>
           <a:ln w="28575">
             <a:solidFill>
-              <a:schemeClr val="tx1"/>
+              <a:schemeClr val="bg1">
+                <a:lumMod val="65000"/>
+              </a:schemeClr>
             </a:solidFill>
           </a:ln>
         </p:spPr>
@@ -6877,7 +6922,9 @@
           </a:prstGeom>
           <a:ln w="28575">
             <a:solidFill>
-              <a:schemeClr val="tx1"/>
+              <a:schemeClr val="bg1">
+                <a:lumMod val="65000"/>
+              </a:schemeClr>
             </a:solidFill>
           </a:ln>
         </p:spPr>
@@ -6912,7 +6959,9 @@
           </a:prstGeom>
           <a:ln w="28575">
             <a:solidFill>
-              <a:schemeClr val="tx1"/>
+              <a:schemeClr val="bg1">
+                <a:lumMod val="65000"/>
+              </a:schemeClr>
             </a:solidFill>
           </a:ln>
         </p:spPr>
@@ -6947,7 +6996,9 @@
           </a:prstGeom>
           <a:ln w="28575">
             <a:solidFill>
-              <a:schemeClr val="tx1"/>
+              <a:schemeClr val="bg1">
+                <a:lumMod val="65000"/>
+              </a:schemeClr>
             </a:solidFill>
           </a:ln>
         </p:spPr>
@@ -6984,7 +7035,9 @@
           </a:prstGeom>
           <a:ln w="28575">
             <a:solidFill>
-              <a:schemeClr val="tx1"/>
+              <a:schemeClr val="bg1">
+                <a:lumMod val="65000"/>
+              </a:schemeClr>
             </a:solidFill>
           </a:ln>
         </p:spPr>
@@ -7019,7 +7072,9 @@
           </a:prstGeom>
           <a:ln w="28575">
             <a:solidFill>
-              <a:schemeClr val="tx1"/>
+              <a:schemeClr val="bg1">
+                <a:lumMod val="65000"/>
+              </a:schemeClr>
             </a:solidFill>
           </a:ln>
         </p:spPr>
@@ -7054,7 +7109,9 @@
           </a:prstGeom>
           <a:ln w="28575">
             <a:solidFill>
-              <a:schemeClr val="tx1"/>
+              <a:schemeClr val="bg1">
+                <a:lumMod val="65000"/>
+              </a:schemeClr>
             </a:solidFill>
           </a:ln>
         </p:spPr>
@@ -7141,7 +7198,9 @@
           <a:noFill/>
           <a:ln w="28575">
             <a:solidFill>
-              <a:schemeClr val="tx1"/>
+              <a:schemeClr val="bg1">
+                <a:lumMod val="65000"/>
+              </a:schemeClr>
             </a:solidFill>
           </a:ln>
         </p:spPr>
@@ -7243,7 +7302,9 @@
           <a:noFill/>
           <a:ln w="28575">
             <a:solidFill>
-              <a:schemeClr val="tx1"/>
+              <a:schemeClr val="bg1">
+                <a:lumMod val="65000"/>
+              </a:schemeClr>
             </a:solidFill>
           </a:ln>
         </p:spPr>
@@ -7345,7 +7406,9 @@
           <a:noFill/>
           <a:ln w="28575">
             <a:solidFill>
-              <a:schemeClr val="tx1"/>
+              <a:schemeClr val="bg1">
+                <a:lumMod val="65000"/>
+              </a:schemeClr>
             </a:solidFill>
           </a:ln>
         </p:spPr>
@@ -7381,7 +7444,7 @@
       </p:sp>
       <p:sp>
         <p:nvSpPr>
-          <p:cNvPr id="2" name="TextBox 1"/>
+          <p:cNvPr id="34" name="TextBox 33"/>
           <p:cNvSpPr txBox="1"/>
           <p:nvPr/>
         </p:nvSpPr>
@@ -7402,10 +7465,22 @@
           <a:lstStyle/>
           <a:p>
             <a:r>
-              <a:rPr lang="en-US" dirty="0" smtClean="0"/>
+              <a:rPr lang="en-US" dirty="0" smtClean="0">
+                <a:solidFill>
+                  <a:schemeClr val="bg1">
+                    <a:lumMod val="65000"/>
+                  </a:schemeClr>
+                </a:solidFill>
+              </a:rPr>
               <a:t>A101</a:t>
             </a:r>
-            <a:endParaRPr lang="en-US" dirty="0"/>
+            <a:endParaRPr lang="en-US" dirty="0">
+              <a:solidFill>
+                <a:schemeClr val="bg1">
+                  <a:lumMod val="65000"/>
+                </a:schemeClr>
+              </a:solidFill>
+            </a:endParaRPr>
           </a:p>
         </p:txBody>
       </p:sp>
@@ -7432,10 +7507,22 @@
           <a:lstStyle/>
           <a:p>
             <a:r>
-              <a:rPr lang="en-US" dirty="0" smtClean="0"/>
+              <a:rPr lang="en-US" dirty="0" smtClean="0">
+                <a:solidFill>
+                  <a:schemeClr val="bg1">
+                    <a:lumMod val="65000"/>
+                  </a:schemeClr>
+                </a:solidFill>
+              </a:rPr>
               <a:t>A102</a:t>
             </a:r>
-            <a:endParaRPr lang="en-US" dirty="0"/>
+            <a:endParaRPr lang="en-US" dirty="0">
+              <a:solidFill>
+                <a:schemeClr val="bg1">
+                  <a:lumMod val="65000"/>
+                </a:schemeClr>
+              </a:solidFill>
+            </a:endParaRPr>
           </a:p>
         </p:txBody>
       </p:sp>
@@ -7462,10 +7549,22 @@
           <a:lstStyle/>
           <a:p>
             <a:r>
-              <a:rPr lang="en-US" dirty="0" smtClean="0"/>
+              <a:rPr lang="en-US" dirty="0" smtClean="0">
+                <a:solidFill>
+                  <a:schemeClr val="bg1">
+                    <a:lumMod val="65000"/>
+                  </a:schemeClr>
+                </a:solidFill>
+              </a:rPr>
               <a:t>A104</a:t>
             </a:r>
-            <a:endParaRPr lang="en-US" dirty="0"/>
+            <a:endParaRPr lang="en-US" dirty="0">
+              <a:solidFill>
+                <a:schemeClr val="bg1">
+                  <a:lumMod val="65000"/>
+                </a:schemeClr>
+              </a:solidFill>
+            </a:endParaRPr>
           </a:p>
         </p:txBody>
       </p:sp>
@@ -7492,10 +7591,22 @@
           <a:lstStyle/>
           <a:p>
             <a:r>
-              <a:rPr lang="en-US" dirty="0" smtClean="0"/>
+              <a:rPr lang="en-US" dirty="0" smtClean="0">
+                <a:solidFill>
+                  <a:schemeClr val="bg1">
+                    <a:lumMod val="65000"/>
+                  </a:schemeClr>
+                </a:solidFill>
+              </a:rPr>
               <a:t>A105</a:t>
             </a:r>
-            <a:endParaRPr lang="en-US" dirty="0"/>
+            <a:endParaRPr lang="en-US" dirty="0">
+              <a:solidFill>
+                <a:schemeClr val="bg1">
+                  <a:lumMod val="65000"/>
+                </a:schemeClr>
+              </a:solidFill>
+            </a:endParaRPr>
           </a:p>
         </p:txBody>
       </p:sp>
@@ -7522,10 +7633,22 @@
           <a:lstStyle/>
           <a:p>
             <a:r>
-              <a:rPr lang="en-US" dirty="0" smtClean="0"/>
+              <a:rPr lang="en-US" dirty="0" smtClean="0">
+                <a:solidFill>
+                  <a:schemeClr val="bg1">
+                    <a:lumMod val="65000"/>
+                  </a:schemeClr>
+                </a:solidFill>
+              </a:rPr>
               <a:t>A106</a:t>
             </a:r>
-            <a:endParaRPr lang="en-US" dirty="0"/>
+            <a:endParaRPr lang="en-US" dirty="0">
+              <a:solidFill>
+                <a:schemeClr val="bg1">
+                  <a:lumMod val="65000"/>
+                </a:schemeClr>
+              </a:solidFill>
+            </a:endParaRPr>
           </a:p>
         </p:txBody>
       </p:sp>
@@ -7552,10 +7675,22 @@
           <a:lstStyle/>
           <a:p>
             <a:r>
-              <a:rPr lang="en-US" dirty="0" smtClean="0"/>
+              <a:rPr lang="en-US" dirty="0" smtClean="0">
+                <a:solidFill>
+                  <a:schemeClr val="bg1">
+                    <a:lumMod val="65000"/>
+                  </a:schemeClr>
+                </a:solidFill>
+              </a:rPr>
               <a:t>A107</a:t>
             </a:r>
-            <a:endParaRPr lang="en-US" dirty="0"/>
+            <a:endParaRPr lang="en-US" dirty="0">
+              <a:solidFill>
+                <a:schemeClr val="bg1">
+                  <a:lumMod val="65000"/>
+                </a:schemeClr>
+              </a:solidFill>
+            </a:endParaRPr>
           </a:p>
         </p:txBody>
       </p:sp>
@@ -7582,10 +7717,22 @@
           <a:lstStyle/>
           <a:p>
             <a:r>
-              <a:rPr lang="en-US" dirty="0" smtClean="0"/>
+              <a:rPr lang="en-US" dirty="0" smtClean="0">
+                <a:solidFill>
+                  <a:schemeClr val="bg1">
+                    <a:lumMod val="65000"/>
+                  </a:schemeClr>
+                </a:solidFill>
+              </a:rPr>
               <a:t>A108</a:t>
             </a:r>
-            <a:endParaRPr lang="en-US" dirty="0"/>
+            <a:endParaRPr lang="en-US" dirty="0">
+              <a:solidFill>
+                <a:schemeClr val="bg1">
+                  <a:lumMod val="65000"/>
+                </a:schemeClr>
+              </a:solidFill>
+            </a:endParaRPr>
           </a:p>
         </p:txBody>
       </p:sp>
@@ -7612,10 +7759,22 @@
           <a:lstStyle/>
           <a:p>
             <a:r>
-              <a:rPr lang="en-US" dirty="0" smtClean="0"/>
+              <a:rPr lang="en-US" dirty="0" smtClean="0">
+                <a:solidFill>
+                  <a:schemeClr val="bg1">
+                    <a:lumMod val="65000"/>
+                  </a:schemeClr>
+                </a:solidFill>
+              </a:rPr>
               <a:t>A109</a:t>
             </a:r>
-            <a:endParaRPr lang="en-US" dirty="0"/>
+            <a:endParaRPr lang="en-US" dirty="0">
+              <a:solidFill>
+                <a:schemeClr val="bg1">
+                  <a:lumMod val="65000"/>
+                </a:schemeClr>
+              </a:solidFill>
+            </a:endParaRPr>
           </a:p>
         </p:txBody>
       </p:sp>
@@ -7642,10 +7801,22 @@
           <a:lstStyle/>
           <a:p>
             <a:r>
-              <a:rPr lang="en-US" dirty="0" smtClean="0"/>
+              <a:rPr lang="en-US" dirty="0" smtClean="0">
+                <a:solidFill>
+                  <a:schemeClr val="bg1">
+                    <a:lumMod val="65000"/>
+                  </a:schemeClr>
+                </a:solidFill>
+              </a:rPr>
               <a:t>A110</a:t>
             </a:r>
-            <a:endParaRPr lang="en-US" dirty="0"/>
+            <a:endParaRPr lang="en-US" dirty="0">
+              <a:solidFill>
+                <a:schemeClr val="bg1">
+                  <a:lumMod val="65000"/>
+                </a:schemeClr>
+              </a:solidFill>
+            </a:endParaRPr>
           </a:p>
         </p:txBody>
       </p:sp>
@@ -7672,10 +7843,22 @@
           <a:lstStyle/>
           <a:p>
             <a:r>
-              <a:rPr lang="en-US" dirty="0" smtClean="0"/>
+              <a:rPr lang="en-US" dirty="0" smtClean="0">
+                <a:solidFill>
+                  <a:schemeClr val="bg1">
+                    <a:lumMod val="65000"/>
+                  </a:schemeClr>
+                </a:solidFill>
+              </a:rPr>
               <a:t>A111</a:t>
             </a:r>
-            <a:endParaRPr lang="en-US" dirty="0"/>
+            <a:endParaRPr lang="en-US" dirty="0">
+              <a:solidFill>
+                <a:schemeClr val="bg1">
+                  <a:lumMod val="65000"/>
+                </a:schemeClr>
+              </a:solidFill>
+            </a:endParaRPr>
           </a:p>
         </p:txBody>
       </p:sp>
@@ -7702,10 +7885,22 @@
           <a:lstStyle/>
           <a:p>
             <a:r>
-              <a:rPr lang="en-US" dirty="0" smtClean="0"/>
+              <a:rPr lang="en-US" dirty="0" smtClean="0">
+                <a:solidFill>
+                  <a:schemeClr val="bg1">
+                    <a:lumMod val="65000"/>
+                  </a:schemeClr>
+                </a:solidFill>
+              </a:rPr>
               <a:t>A112</a:t>
             </a:r>
-            <a:endParaRPr lang="en-US" dirty="0"/>
+            <a:endParaRPr lang="en-US" dirty="0">
+              <a:solidFill>
+                <a:schemeClr val="bg1">
+                  <a:lumMod val="65000"/>
+                </a:schemeClr>
+              </a:solidFill>
+            </a:endParaRPr>
           </a:p>
         </p:txBody>
       </p:sp>
@@ -7732,10 +7927,22 @@
           <a:lstStyle/>
           <a:p>
             <a:r>
-              <a:rPr lang="en-US" dirty="0" smtClean="0"/>
+              <a:rPr lang="en-US" dirty="0" smtClean="0">
+                <a:solidFill>
+                  <a:schemeClr val="bg1">
+                    <a:lumMod val="65000"/>
+                  </a:schemeClr>
+                </a:solidFill>
+              </a:rPr>
               <a:t>A113</a:t>
             </a:r>
-            <a:endParaRPr lang="en-US" dirty="0"/>
+            <a:endParaRPr lang="en-US" dirty="0">
+              <a:solidFill>
+                <a:schemeClr val="bg1">
+                  <a:lumMod val="65000"/>
+                </a:schemeClr>
+              </a:solidFill>
+            </a:endParaRPr>
           </a:p>
         </p:txBody>
       </p:sp>
@@ -7762,10 +7969,22 @@
           <a:lstStyle/>
           <a:p>
             <a:r>
-              <a:rPr lang="en-US" dirty="0" smtClean="0"/>
+              <a:rPr lang="en-US" dirty="0" smtClean="0">
+                <a:solidFill>
+                  <a:schemeClr val="bg1">
+                    <a:lumMod val="65000"/>
+                  </a:schemeClr>
+                </a:solidFill>
+              </a:rPr>
               <a:t>A114</a:t>
             </a:r>
-            <a:endParaRPr lang="en-US" dirty="0"/>
+            <a:endParaRPr lang="en-US" dirty="0">
+              <a:solidFill>
+                <a:schemeClr val="bg1">
+                  <a:lumMod val="65000"/>
+                </a:schemeClr>
+              </a:solidFill>
+            </a:endParaRPr>
           </a:p>
         </p:txBody>
       </p:sp>
@@ -7792,10 +8011,22 @@
           <a:lstStyle/>
           <a:p>
             <a:r>
-              <a:rPr lang="en-US" dirty="0" smtClean="0"/>
+              <a:rPr lang="en-US" dirty="0" smtClean="0">
+                <a:solidFill>
+                  <a:schemeClr val="bg1">
+                    <a:lumMod val="65000"/>
+                  </a:schemeClr>
+                </a:solidFill>
+              </a:rPr>
               <a:t>A115</a:t>
             </a:r>
-            <a:endParaRPr lang="en-US" dirty="0"/>
+            <a:endParaRPr lang="en-US" dirty="0">
+              <a:solidFill>
+                <a:schemeClr val="bg1">
+                  <a:lumMod val="65000"/>
+                </a:schemeClr>
+              </a:solidFill>
+            </a:endParaRPr>
           </a:p>
         </p:txBody>
       </p:sp>
@@ -7822,10 +8053,22 @@
           <a:lstStyle/>
           <a:p>
             <a:r>
-              <a:rPr lang="en-US" dirty="0" smtClean="0"/>
+              <a:rPr lang="en-US" dirty="0" smtClean="0">
+                <a:solidFill>
+                  <a:schemeClr val="bg1">
+                    <a:lumMod val="65000"/>
+                  </a:schemeClr>
+                </a:solidFill>
+              </a:rPr>
               <a:t>A116</a:t>
             </a:r>
-            <a:endParaRPr lang="en-US" dirty="0"/>
+            <a:endParaRPr lang="en-US" dirty="0">
+              <a:solidFill>
+                <a:schemeClr val="bg1">
+                  <a:lumMod val="65000"/>
+                </a:schemeClr>
+              </a:solidFill>
+            </a:endParaRPr>
           </a:p>
         </p:txBody>
       </p:sp>
@@ -7852,10 +8095,22 @@
           <a:lstStyle/>
           <a:p>
             <a:r>
-              <a:rPr lang="en-US" dirty="0" smtClean="0"/>
+              <a:rPr lang="en-US" dirty="0" smtClean="0">
+                <a:solidFill>
+                  <a:schemeClr val="bg1">
+                    <a:lumMod val="65000"/>
+                  </a:schemeClr>
+                </a:solidFill>
+              </a:rPr>
               <a:t>A117</a:t>
             </a:r>
-            <a:endParaRPr lang="en-US" dirty="0"/>
+            <a:endParaRPr lang="en-US" dirty="0">
+              <a:solidFill>
+                <a:schemeClr val="bg1">
+                  <a:lumMod val="65000"/>
+                </a:schemeClr>
+              </a:solidFill>
+            </a:endParaRPr>
           </a:p>
         </p:txBody>
       </p:sp>
@@ -7882,10 +8137,22 @@
           <a:lstStyle/>
           <a:p>
             <a:r>
-              <a:rPr lang="en-US" dirty="0" smtClean="0"/>
+              <a:rPr lang="en-US" dirty="0" smtClean="0">
+                <a:solidFill>
+                  <a:schemeClr val="bg1">
+                    <a:lumMod val="65000"/>
+                  </a:schemeClr>
+                </a:solidFill>
+              </a:rPr>
               <a:t>A118</a:t>
             </a:r>
-            <a:endParaRPr lang="en-US" dirty="0"/>
+            <a:endParaRPr lang="en-US" dirty="0">
+              <a:solidFill>
+                <a:schemeClr val="bg1">
+                  <a:lumMod val="65000"/>
+                </a:schemeClr>
+              </a:solidFill>
+            </a:endParaRPr>
           </a:p>
         </p:txBody>
       </p:sp>
@@ -7912,10 +8179,22 @@
           <a:lstStyle/>
           <a:p>
             <a:r>
-              <a:rPr lang="en-US" dirty="0" smtClean="0"/>
+              <a:rPr lang="en-US" dirty="0" smtClean="0">
+                <a:solidFill>
+                  <a:schemeClr val="bg1">
+                    <a:lumMod val="65000"/>
+                  </a:schemeClr>
+                </a:solidFill>
+              </a:rPr>
               <a:t>A119</a:t>
             </a:r>
-            <a:endParaRPr lang="en-US" dirty="0"/>
+            <a:endParaRPr lang="en-US" dirty="0">
+              <a:solidFill>
+                <a:schemeClr val="bg1">
+                  <a:lumMod val="65000"/>
+                </a:schemeClr>
+              </a:solidFill>
+            </a:endParaRPr>
           </a:p>
         </p:txBody>
       </p:sp>
@@ -7942,10 +8221,22 @@
           <a:lstStyle/>
           <a:p>
             <a:r>
-              <a:rPr lang="en-US" dirty="0" smtClean="0"/>
+              <a:rPr lang="en-US" dirty="0" smtClean="0">
+                <a:solidFill>
+                  <a:schemeClr val="bg1">
+                    <a:lumMod val="65000"/>
+                  </a:schemeClr>
+                </a:solidFill>
+              </a:rPr>
               <a:t>A120</a:t>
             </a:r>
-            <a:endParaRPr lang="en-US" dirty="0"/>
+            <a:endParaRPr lang="en-US" dirty="0">
+              <a:solidFill>
+                <a:schemeClr val="bg1">
+                  <a:lumMod val="65000"/>
+                </a:schemeClr>
+              </a:solidFill>
+            </a:endParaRPr>
           </a:p>
         </p:txBody>
       </p:sp>
@@ -7972,10 +8263,22 @@
           <a:lstStyle/>
           <a:p>
             <a:r>
-              <a:rPr lang="en-US" dirty="0" smtClean="0"/>
+              <a:rPr lang="en-US" dirty="0" smtClean="0">
+                <a:solidFill>
+                  <a:schemeClr val="bg1">
+                    <a:lumMod val="65000"/>
+                  </a:schemeClr>
+                </a:solidFill>
+              </a:rPr>
               <a:t>A121</a:t>
             </a:r>
-            <a:endParaRPr lang="en-US" dirty="0"/>
+            <a:endParaRPr lang="en-US" dirty="0">
+              <a:solidFill>
+                <a:schemeClr val="bg1">
+                  <a:lumMod val="65000"/>
+                </a:schemeClr>
+              </a:solidFill>
+            </a:endParaRPr>
           </a:p>
         </p:txBody>
       </p:sp>
@@ -8002,10 +8305,22 @@
           <a:lstStyle/>
           <a:p>
             <a:r>
-              <a:rPr lang="en-US" dirty="0" smtClean="0"/>
+              <a:rPr lang="en-US" dirty="0" smtClean="0">
+                <a:solidFill>
+                  <a:schemeClr val="bg1">
+                    <a:lumMod val="65000"/>
+                  </a:schemeClr>
+                </a:solidFill>
+              </a:rPr>
               <a:t>A122</a:t>
             </a:r>
-            <a:endParaRPr lang="en-US" dirty="0"/>
+            <a:endParaRPr lang="en-US" dirty="0">
+              <a:solidFill>
+                <a:schemeClr val="bg1">
+                  <a:lumMod val="65000"/>
+                </a:schemeClr>
+              </a:solidFill>
+            </a:endParaRPr>
           </a:p>
         </p:txBody>
       </p:sp>
@@ -8032,10 +8347,22 @@
           <a:lstStyle/>
           <a:p>
             <a:r>
-              <a:rPr lang="en-US" dirty="0" smtClean="0"/>
+              <a:rPr lang="en-US" dirty="0" smtClean="0">
+                <a:solidFill>
+                  <a:schemeClr val="bg1">
+                    <a:lumMod val="65000"/>
+                  </a:schemeClr>
+                </a:solidFill>
+              </a:rPr>
               <a:t>A123</a:t>
             </a:r>
-            <a:endParaRPr lang="en-US" dirty="0"/>
+            <a:endParaRPr lang="en-US" dirty="0">
+              <a:solidFill>
+                <a:schemeClr val="bg1">
+                  <a:lumMod val="65000"/>
+                </a:schemeClr>
+              </a:solidFill>
+            </a:endParaRPr>
           </a:p>
         </p:txBody>
       </p:sp>
@@ -8062,10 +8389,22 @@
           <a:lstStyle/>
           <a:p>
             <a:r>
-              <a:rPr lang="en-US" dirty="0" smtClean="0"/>
+              <a:rPr lang="en-US" dirty="0" smtClean="0">
+                <a:solidFill>
+                  <a:schemeClr val="bg1">
+                    <a:lumMod val="65000"/>
+                  </a:schemeClr>
+                </a:solidFill>
+              </a:rPr>
               <a:t>A124</a:t>
             </a:r>
-            <a:endParaRPr lang="en-US" dirty="0"/>
+            <a:endParaRPr lang="en-US" dirty="0">
+              <a:solidFill>
+                <a:schemeClr val="bg1">
+                  <a:lumMod val="65000"/>
+                </a:schemeClr>
+              </a:solidFill>
+            </a:endParaRPr>
           </a:p>
         </p:txBody>
       </p:sp>
@@ -8092,10 +8431,22 @@
           <a:lstStyle/>
           <a:p>
             <a:r>
-              <a:rPr lang="en-US" dirty="0" smtClean="0"/>
+              <a:rPr lang="en-US" dirty="0" smtClean="0">
+                <a:solidFill>
+                  <a:schemeClr val="bg1">
+                    <a:lumMod val="65000"/>
+                  </a:schemeClr>
+                </a:solidFill>
+              </a:rPr>
               <a:t>A125</a:t>
             </a:r>
-            <a:endParaRPr lang="en-US" dirty="0"/>
+            <a:endParaRPr lang="en-US" dirty="0">
+              <a:solidFill>
+                <a:schemeClr val="bg1">
+                  <a:lumMod val="65000"/>
+                </a:schemeClr>
+              </a:solidFill>
+            </a:endParaRPr>
           </a:p>
         </p:txBody>
       </p:sp>
@@ -8122,10 +8473,22 @@
           <a:lstStyle/>
           <a:p>
             <a:r>
-              <a:rPr lang="en-US" dirty="0" smtClean="0"/>
+              <a:rPr lang="en-US" dirty="0" smtClean="0">
+                <a:solidFill>
+                  <a:schemeClr val="bg1">
+                    <a:lumMod val="65000"/>
+                  </a:schemeClr>
+                </a:solidFill>
+              </a:rPr>
               <a:t>A126</a:t>
             </a:r>
-            <a:endParaRPr lang="en-US" dirty="0"/>
+            <a:endParaRPr lang="en-US" dirty="0">
+              <a:solidFill>
+                <a:schemeClr val="bg1">
+                  <a:lumMod val="65000"/>
+                </a:schemeClr>
+              </a:solidFill>
+            </a:endParaRPr>
           </a:p>
         </p:txBody>
       </p:sp>
@@ -8152,17 +8515,2270 @@
           <a:lstStyle/>
           <a:p>
             <a:r>
-              <a:rPr lang="en-US" dirty="0" smtClean="0"/>
+              <a:rPr lang="en-US" dirty="0" smtClean="0">
+                <a:solidFill>
+                  <a:schemeClr val="bg1">
+                    <a:lumMod val="65000"/>
+                  </a:schemeClr>
+                </a:solidFill>
+              </a:rPr>
               <a:t>A127</a:t>
             </a:r>
-            <a:endParaRPr lang="en-US" dirty="0"/>
+            <a:endParaRPr lang="en-US" dirty="0">
+              <a:solidFill>
+                <a:schemeClr val="bg1">
+                  <a:lumMod val="65000"/>
+                </a:schemeClr>
+              </a:solidFill>
+            </a:endParaRPr>
           </a:p>
         </p:txBody>
       </p:sp>
     </p:spTree>
     <p:extLst>
       <p:ext uri="{BB962C8B-B14F-4D97-AF65-F5344CB8AC3E}">
-        <p14:creationId xmlns:p14="http://schemas.microsoft.com/office/powerpoint/2010/main" val="1865015002"/>
+        <p14:creationId xmlns:p14="http://schemas.microsoft.com/office/powerpoint/2010/main" val="995801047"/>
+      </p:ext>
+    </p:extLst>
+  </p:cSld>
+  <p:clrMapOvr>
+    <a:masterClrMapping/>
+  </p:clrMapOvr>
+  <p:timing>
+    <p:tnLst>
+      <p:par>
+        <p:cTn id="1" dur="indefinite" restart="never" nodeType="tmRoot"/>
+      </p:par>
+    </p:tnLst>
+  </p:timing>
+</p:sld>
+</file>
+
+<file path=ppt/slides/slide4.xml><?xml version="1.0" encoding="utf-8"?>
+<p:sld xmlns:a="http://schemas.openxmlformats.org/drawingml/2006/main" xmlns:r="http://schemas.openxmlformats.org/officeDocument/2006/relationships" xmlns:p="http://schemas.openxmlformats.org/presentationml/2006/main">
+  <p:cSld>
+    <p:spTree>
+      <p:nvGrpSpPr>
+        <p:cNvPr id="1" name=""/>
+        <p:cNvGrpSpPr/>
+        <p:nvPr/>
+      </p:nvGrpSpPr>
+      <p:grpSpPr>
+        <a:xfrm>
+          <a:off x="0" y="0"/>
+          <a:ext cx="0" cy="0"/>
+          <a:chOff x="0" y="0"/>
+          <a:chExt cx="0" cy="0"/>
+        </a:xfrm>
+      </p:grpSpPr>
+      <p:sp>
+        <p:nvSpPr>
+          <p:cNvPr id="12" name="Freeform 11"/>
+          <p:cNvSpPr/>
+          <p:nvPr/>
+        </p:nvSpPr>
+        <p:spPr>
+          <a:xfrm>
+            <a:off x="1614115" y="1009816"/>
+            <a:ext cx="8881607" cy="4086970"/>
+          </a:xfrm>
+          <a:custGeom>
+            <a:avLst/>
+            <a:gdLst>
+              <a:gd name="connsiteX0" fmla="*/ 1232452 w 8881607"/>
+              <a:gd name="connsiteY0" fmla="*/ 0 h 4086970"/>
+              <a:gd name="connsiteX1" fmla="*/ 0 w 8881607"/>
+              <a:gd name="connsiteY1" fmla="*/ 2886323 h 4086970"/>
+              <a:gd name="connsiteX2" fmla="*/ 7124368 w 8881607"/>
+              <a:gd name="connsiteY2" fmla="*/ 4086970 h 4086970"/>
+              <a:gd name="connsiteX3" fmla="*/ 8881607 w 8881607"/>
+              <a:gd name="connsiteY3" fmla="*/ 1614114 h 4086970"/>
+              <a:gd name="connsiteX4" fmla="*/ 1232452 w 8881607"/>
+              <a:gd name="connsiteY4" fmla="*/ 0 h 4086970"/>
+            </a:gdLst>
+            <a:ahLst/>
+            <a:cxnLst>
+              <a:cxn ang="0">
+                <a:pos x="connsiteX0" y="connsiteY0"/>
+              </a:cxn>
+              <a:cxn ang="0">
+                <a:pos x="connsiteX1" y="connsiteY1"/>
+              </a:cxn>
+              <a:cxn ang="0">
+                <a:pos x="connsiteX2" y="connsiteY2"/>
+              </a:cxn>
+              <a:cxn ang="0">
+                <a:pos x="connsiteX3" y="connsiteY3"/>
+              </a:cxn>
+              <a:cxn ang="0">
+                <a:pos x="connsiteX4" y="connsiteY4"/>
+              </a:cxn>
+            </a:cxnLst>
+            <a:rect l="l" t="t" r="r" b="b"/>
+            <a:pathLst>
+              <a:path w="8881607" h="4086970">
+                <a:moveTo>
+                  <a:pt x="1232452" y="0"/>
+                </a:moveTo>
+                <a:lnTo>
+                  <a:pt x="0" y="2886323"/>
+                </a:lnTo>
+                <a:lnTo>
+                  <a:pt x="7124368" y="4086970"/>
+                </a:lnTo>
+                <a:lnTo>
+                  <a:pt x="8881607" y="1614114"/>
+                </a:lnTo>
+                <a:lnTo>
+                  <a:pt x="1232452" y="0"/>
+                </a:lnTo>
+                <a:close/>
+              </a:path>
+            </a:pathLst>
+          </a:custGeom>
+          <a:noFill/>
+          <a:ln w="28575">
+            <a:solidFill>
+              <a:schemeClr val="tx1"/>
+            </a:solidFill>
+          </a:ln>
+        </p:spPr>
+        <p:style>
+          <a:lnRef idx="2">
+            <a:schemeClr val="accent1">
+              <a:shade val="50000"/>
+            </a:schemeClr>
+          </a:lnRef>
+          <a:fillRef idx="1">
+            <a:schemeClr val="accent1"/>
+          </a:fillRef>
+          <a:effectRef idx="0">
+            <a:schemeClr val="accent1"/>
+          </a:effectRef>
+          <a:fontRef idx="minor">
+            <a:schemeClr val="lt1"/>
+          </a:fontRef>
+        </p:style>
+        <p:txBody>
+          <a:bodyPr rtlCol="0" anchor="ctr"/>
+          <a:lstStyle/>
+          <a:p>
+            <a:pPr algn="ctr"/>
+            <a:endParaRPr lang="en-US"/>
+          </a:p>
+        </p:txBody>
+      </p:sp>
+      <p:sp>
+        <p:nvSpPr>
+          <p:cNvPr id="13" name="Freeform 12"/>
+          <p:cNvSpPr/>
+          <p:nvPr/>
+        </p:nvSpPr>
+        <p:spPr>
+          <a:xfrm>
+            <a:off x="2862470" y="2011680"/>
+            <a:ext cx="6337189" cy="2234317"/>
+          </a:xfrm>
+          <a:custGeom>
+            <a:avLst/>
+            <a:gdLst>
+              <a:gd name="connsiteX0" fmla="*/ 500932 w 6337189"/>
+              <a:gd name="connsiteY0" fmla="*/ 0 h 2234317"/>
+              <a:gd name="connsiteX1" fmla="*/ 0 w 6337189"/>
+              <a:gd name="connsiteY1" fmla="*/ 1168842 h 2234317"/>
+              <a:gd name="connsiteX2" fmla="*/ 246490 w 6337189"/>
+              <a:gd name="connsiteY2" fmla="*/ 1272209 h 2234317"/>
+              <a:gd name="connsiteX3" fmla="*/ 5526156 w 6337189"/>
+              <a:gd name="connsiteY3" fmla="*/ 2234317 h 2234317"/>
+              <a:gd name="connsiteX4" fmla="*/ 6337189 w 6337189"/>
+              <a:gd name="connsiteY4" fmla="*/ 1129085 h 2234317"/>
+              <a:gd name="connsiteX5" fmla="*/ 500932 w 6337189"/>
+              <a:gd name="connsiteY5" fmla="*/ 0 h 2234317"/>
+            </a:gdLst>
+            <a:ahLst/>
+            <a:cxnLst>
+              <a:cxn ang="0">
+                <a:pos x="connsiteX0" y="connsiteY0"/>
+              </a:cxn>
+              <a:cxn ang="0">
+                <a:pos x="connsiteX1" y="connsiteY1"/>
+              </a:cxn>
+              <a:cxn ang="0">
+                <a:pos x="connsiteX2" y="connsiteY2"/>
+              </a:cxn>
+              <a:cxn ang="0">
+                <a:pos x="connsiteX3" y="connsiteY3"/>
+              </a:cxn>
+              <a:cxn ang="0">
+                <a:pos x="connsiteX4" y="connsiteY4"/>
+              </a:cxn>
+              <a:cxn ang="0">
+                <a:pos x="connsiteX5" y="connsiteY5"/>
+              </a:cxn>
+            </a:cxnLst>
+            <a:rect l="l" t="t" r="r" b="b"/>
+            <a:pathLst>
+              <a:path w="6337189" h="2234317">
+                <a:moveTo>
+                  <a:pt x="500932" y="0"/>
+                </a:moveTo>
+                <a:lnTo>
+                  <a:pt x="0" y="1168842"/>
+                </a:lnTo>
+                <a:lnTo>
+                  <a:pt x="246490" y="1272209"/>
+                </a:lnTo>
+                <a:lnTo>
+                  <a:pt x="5526156" y="2234317"/>
+                </a:lnTo>
+                <a:lnTo>
+                  <a:pt x="6337189" y="1129085"/>
+                </a:lnTo>
+                <a:lnTo>
+                  <a:pt x="500932" y="0"/>
+                </a:lnTo>
+                <a:close/>
+              </a:path>
+            </a:pathLst>
+          </a:custGeom>
+          <a:noFill/>
+          <a:ln w="38100">
+            <a:solidFill>
+              <a:schemeClr val="tx1"/>
+            </a:solidFill>
+          </a:ln>
+        </p:spPr>
+        <p:style>
+          <a:lnRef idx="2">
+            <a:schemeClr val="accent1">
+              <a:shade val="50000"/>
+            </a:schemeClr>
+          </a:lnRef>
+          <a:fillRef idx="1">
+            <a:schemeClr val="accent1"/>
+          </a:fillRef>
+          <a:effectRef idx="0">
+            <a:schemeClr val="accent1"/>
+          </a:effectRef>
+          <a:fontRef idx="minor">
+            <a:schemeClr val="lt1"/>
+          </a:fontRef>
+        </p:style>
+        <p:txBody>
+          <a:bodyPr rtlCol="0" anchor="ctr"/>
+          <a:lstStyle/>
+          <a:p>
+            <a:pPr algn="ctr"/>
+            <a:endParaRPr lang="en-US"/>
+          </a:p>
+        </p:txBody>
+      </p:sp>
+      <p:cxnSp>
+        <p:nvCxnSpPr>
+          <p:cNvPr id="19" name="Straight Connector 18"/>
+          <p:cNvCxnSpPr/>
+          <p:nvPr/>
+        </p:nvCxnSpPr>
+        <p:spPr>
+          <a:xfrm flipH="1">
+            <a:off x="3567113" y="1185863"/>
+            <a:ext cx="161925" cy="881062"/>
+          </a:xfrm>
+          <a:prstGeom prst="line">
+            <a:avLst/>
+          </a:prstGeom>
+          <a:ln w="28575">
+            <a:solidFill>
+              <a:schemeClr val="tx1"/>
+            </a:solidFill>
+          </a:ln>
+        </p:spPr>
+        <p:style>
+          <a:lnRef idx="1">
+            <a:schemeClr val="accent1"/>
+          </a:lnRef>
+          <a:fillRef idx="0">
+            <a:schemeClr val="accent1"/>
+          </a:fillRef>
+          <a:effectRef idx="0">
+            <a:schemeClr val="accent1"/>
+          </a:effectRef>
+          <a:fontRef idx="minor">
+            <a:schemeClr val="tx1"/>
+          </a:fontRef>
+        </p:style>
+      </p:cxnSp>
+      <p:cxnSp>
+        <p:nvCxnSpPr>
+          <p:cNvPr id="24" name="Straight Connector 23"/>
+          <p:cNvCxnSpPr/>
+          <p:nvPr/>
+        </p:nvCxnSpPr>
+        <p:spPr>
+          <a:xfrm flipH="1">
+            <a:off x="4448175" y="1366838"/>
+            <a:ext cx="157164" cy="862012"/>
+          </a:xfrm>
+          <a:prstGeom prst="line">
+            <a:avLst/>
+          </a:prstGeom>
+          <a:ln w="28575">
+            <a:solidFill>
+              <a:schemeClr val="tx1"/>
+            </a:solidFill>
+          </a:ln>
+        </p:spPr>
+        <p:style>
+          <a:lnRef idx="1">
+            <a:schemeClr val="accent1"/>
+          </a:lnRef>
+          <a:fillRef idx="0">
+            <a:schemeClr val="accent1"/>
+          </a:fillRef>
+          <a:effectRef idx="0">
+            <a:schemeClr val="accent1"/>
+          </a:effectRef>
+          <a:fontRef idx="minor">
+            <a:schemeClr val="tx1"/>
+          </a:fontRef>
+        </p:style>
+      </p:cxnSp>
+      <p:cxnSp>
+        <p:nvCxnSpPr>
+          <p:cNvPr id="26" name="Straight Connector 25"/>
+          <p:cNvCxnSpPr/>
+          <p:nvPr/>
+        </p:nvCxnSpPr>
+        <p:spPr>
+          <a:xfrm flipH="1">
+            <a:off x="4872038" y="1457325"/>
+            <a:ext cx="157164" cy="862012"/>
+          </a:xfrm>
+          <a:prstGeom prst="line">
+            <a:avLst/>
+          </a:prstGeom>
+          <a:ln w="28575">
+            <a:solidFill>
+              <a:schemeClr val="tx1"/>
+            </a:solidFill>
+          </a:ln>
+        </p:spPr>
+        <p:style>
+          <a:lnRef idx="1">
+            <a:schemeClr val="accent1"/>
+          </a:lnRef>
+          <a:fillRef idx="0">
+            <a:schemeClr val="accent1"/>
+          </a:fillRef>
+          <a:effectRef idx="0">
+            <a:schemeClr val="accent1"/>
+          </a:effectRef>
+          <a:fontRef idx="minor">
+            <a:schemeClr val="tx1"/>
+          </a:fontRef>
+        </p:style>
+      </p:cxnSp>
+      <p:cxnSp>
+        <p:nvCxnSpPr>
+          <p:cNvPr id="27" name="Straight Connector 26"/>
+          <p:cNvCxnSpPr/>
+          <p:nvPr/>
+        </p:nvCxnSpPr>
+        <p:spPr>
+          <a:xfrm flipH="1">
+            <a:off x="5305425" y="1547813"/>
+            <a:ext cx="157164" cy="857250"/>
+          </a:xfrm>
+          <a:prstGeom prst="line">
+            <a:avLst/>
+          </a:prstGeom>
+          <a:ln w="28575">
+            <a:solidFill>
+              <a:schemeClr val="tx1"/>
+            </a:solidFill>
+          </a:ln>
+        </p:spPr>
+        <p:style>
+          <a:lnRef idx="1">
+            <a:schemeClr val="accent1"/>
+          </a:lnRef>
+          <a:fillRef idx="0">
+            <a:schemeClr val="accent1"/>
+          </a:fillRef>
+          <a:effectRef idx="0">
+            <a:schemeClr val="accent1"/>
+          </a:effectRef>
+          <a:fontRef idx="minor">
+            <a:schemeClr val="tx1"/>
+          </a:fontRef>
+        </p:style>
+      </p:cxnSp>
+      <p:cxnSp>
+        <p:nvCxnSpPr>
+          <p:cNvPr id="29" name="Straight Connector 28"/>
+          <p:cNvCxnSpPr/>
+          <p:nvPr/>
+        </p:nvCxnSpPr>
+        <p:spPr>
+          <a:xfrm flipH="1">
+            <a:off x="6148388" y="1724026"/>
+            <a:ext cx="152401" cy="838199"/>
+          </a:xfrm>
+          <a:prstGeom prst="line">
+            <a:avLst/>
+          </a:prstGeom>
+          <a:ln w="28575">
+            <a:solidFill>
+              <a:schemeClr val="tx1"/>
+            </a:solidFill>
+          </a:ln>
+        </p:spPr>
+        <p:style>
+          <a:lnRef idx="1">
+            <a:schemeClr val="accent1"/>
+          </a:lnRef>
+          <a:fillRef idx="0">
+            <a:schemeClr val="accent1"/>
+          </a:fillRef>
+          <a:effectRef idx="0">
+            <a:schemeClr val="accent1"/>
+          </a:effectRef>
+          <a:fontRef idx="minor">
+            <a:schemeClr val="tx1"/>
+          </a:fontRef>
+        </p:style>
+      </p:cxnSp>
+      <p:cxnSp>
+        <p:nvCxnSpPr>
+          <p:cNvPr id="31" name="Straight Connector 30"/>
+          <p:cNvCxnSpPr/>
+          <p:nvPr/>
+        </p:nvCxnSpPr>
+        <p:spPr>
+          <a:xfrm flipH="1">
+            <a:off x="6753225" y="1862138"/>
+            <a:ext cx="147640" cy="809625"/>
+          </a:xfrm>
+          <a:prstGeom prst="line">
+            <a:avLst/>
+          </a:prstGeom>
+          <a:ln w="28575">
+            <a:solidFill>
+              <a:schemeClr val="tx1"/>
+            </a:solidFill>
+          </a:ln>
+        </p:spPr>
+        <p:style>
+          <a:lnRef idx="1">
+            <a:schemeClr val="accent1"/>
+          </a:lnRef>
+          <a:fillRef idx="0">
+            <a:schemeClr val="accent1"/>
+          </a:fillRef>
+          <a:effectRef idx="0">
+            <a:schemeClr val="accent1"/>
+          </a:effectRef>
+          <a:fontRef idx="minor">
+            <a:schemeClr val="tx1"/>
+          </a:fontRef>
+        </p:style>
+      </p:cxnSp>
+      <p:cxnSp>
+        <p:nvCxnSpPr>
+          <p:cNvPr id="33" name="Straight Connector 32"/>
+          <p:cNvCxnSpPr/>
+          <p:nvPr/>
+        </p:nvCxnSpPr>
+        <p:spPr>
+          <a:xfrm flipH="1">
+            <a:off x="7162800" y="1957388"/>
+            <a:ext cx="142878" cy="790575"/>
+          </a:xfrm>
+          <a:prstGeom prst="line">
+            <a:avLst/>
+          </a:prstGeom>
+          <a:ln w="28575">
+            <a:solidFill>
+              <a:schemeClr val="tx1"/>
+            </a:solidFill>
+          </a:ln>
+        </p:spPr>
+        <p:style>
+          <a:lnRef idx="1">
+            <a:schemeClr val="accent1"/>
+          </a:lnRef>
+          <a:fillRef idx="0">
+            <a:schemeClr val="accent1"/>
+          </a:fillRef>
+          <a:effectRef idx="0">
+            <a:schemeClr val="accent1"/>
+          </a:effectRef>
+          <a:fontRef idx="minor">
+            <a:schemeClr val="tx1"/>
+          </a:fontRef>
+        </p:style>
+      </p:cxnSp>
+      <p:cxnSp>
+        <p:nvCxnSpPr>
+          <p:cNvPr id="35" name="Straight Connector 34"/>
+          <p:cNvCxnSpPr/>
+          <p:nvPr/>
+        </p:nvCxnSpPr>
+        <p:spPr>
+          <a:xfrm flipH="1">
+            <a:off x="7767637" y="2085975"/>
+            <a:ext cx="142878" cy="790575"/>
+          </a:xfrm>
+          <a:prstGeom prst="line">
+            <a:avLst/>
+          </a:prstGeom>
+          <a:ln w="28575">
+            <a:solidFill>
+              <a:schemeClr val="tx1"/>
+            </a:solidFill>
+          </a:ln>
+        </p:spPr>
+        <p:style>
+          <a:lnRef idx="1">
+            <a:schemeClr val="accent1"/>
+          </a:lnRef>
+          <a:fillRef idx="0">
+            <a:schemeClr val="accent1"/>
+          </a:fillRef>
+          <a:effectRef idx="0">
+            <a:schemeClr val="accent1"/>
+          </a:effectRef>
+          <a:fontRef idx="minor">
+            <a:schemeClr val="tx1"/>
+          </a:fontRef>
+        </p:style>
+      </p:cxnSp>
+      <p:cxnSp>
+        <p:nvCxnSpPr>
+          <p:cNvPr id="36" name="Straight Connector 35"/>
+          <p:cNvCxnSpPr/>
+          <p:nvPr/>
+        </p:nvCxnSpPr>
+        <p:spPr>
+          <a:xfrm flipH="1">
+            <a:off x="8177212" y="2152650"/>
+            <a:ext cx="142878" cy="790575"/>
+          </a:xfrm>
+          <a:prstGeom prst="line">
+            <a:avLst/>
+          </a:prstGeom>
+          <a:ln w="28575">
+            <a:solidFill>
+              <a:schemeClr val="tx1"/>
+            </a:solidFill>
+          </a:ln>
+        </p:spPr>
+        <p:style>
+          <a:lnRef idx="1">
+            <a:schemeClr val="accent1"/>
+          </a:lnRef>
+          <a:fillRef idx="0">
+            <a:schemeClr val="accent1"/>
+          </a:fillRef>
+          <a:effectRef idx="0">
+            <a:schemeClr val="accent1"/>
+          </a:effectRef>
+          <a:fontRef idx="minor">
+            <a:schemeClr val="tx1"/>
+          </a:fontRef>
+        </p:style>
+      </p:cxnSp>
+      <p:cxnSp>
+        <p:nvCxnSpPr>
+          <p:cNvPr id="37" name="Straight Connector 36"/>
+          <p:cNvCxnSpPr/>
+          <p:nvPr/>
+        </p:nvCxnSpPr>
+        <p:spPr>
+          <a:xfrm flipH="1">
+            <a:off x="8943974" y="2314575"/>
+            <a:ext cx="142878" cy="790575"/>
+          </a:xfrm>
+          <a:prstGeom prst="line">
+            <a:avLst/>
+          </a:prstGeom>
+          <a:ln w="28575">
+            <a:solidFill>
+              <a:schemeClr val="tx1"/>
+            </a:solidFill>
+          </a:ln>
+        </p:spPr>
+        <p:style>
+          <a:lnRef idx="1">
+            <a:schemeClr val="accent1"/>
+          </a:lnRef>
+          <a:fillRef idx="0">
+            <a:schemeClr val="accent1"/>
+          </a:fillRef>
+          <a:effectRef idx="0">
+            <a:schemeClr val="accent1"/>
+          </a:effectRef>
+          <a:fontRef idx="minor">
+            <a:schemeClr val="tx1"/>
+          </a:fontRef>
+        </p:style>
+      </p:cxnSp>
+      <p:cxnSp>
+        <p:nvCxnSpPr>
+          <p:cNvPr id="38" name="Straight Connector 37"/>
+          <p:cNvCxnSpPr>
+            <a:stCxn id="13" idx="4"/>
+          </p:cNvCxnSpPr>
+          <p:nvPr/>
+        </p:nvCxnSpPr>
+        <p:spPr>
+          <a:xfrm>
+            <a:off x="9199659" y="3140765"/>
+            <a:ext cx="601566" cy="450160"/>
+          </a:xfrm>
+          <a:prstGeom prst="line">
+            <a:avLst/>
+          </a:prstGeom>
+          <a:ln w="28575">
+            <a:solidFill>
+              <a:schemeClr val="tx1"/>
+            </a:solidFill>
+          </a:ln>
+        </p:spPr>
+        <p:style>
+          <a:lnRef idx="1">
+            <a:schemeClr val="accent1"/>
+          </a:lnRef>
+          <a:fillRef idx="0">
+            <a:schemeClr val="accent1"/>
+          </a:fillRef>
+          <a:effectRef idx="0">
+            <a:schemeClr val="accent1"/>
+          </a:effectRef>
+          <a:fontRef idx="minor">
+            <a:schemeClr val="tx1"/>
+          </a:fontRef>
+        </p:style>
+      </p:cxnSp>
+      <p:cxnSp>
+        <p:nvCxnSpPr>
+          <p:cNvPr id="41" name="Straight Connector 40"/>
+          <p:cNvCxnSpPr/>
+          <p:nvPr/>
+        </p:nvCxnSpPr>
+        <p:spPr>
+          <a:xfrm>
+            <a:off x="8966297" y="3455090"/>
+            <a:ext cx="601566" cy="450160"/>
+          </a:xfrm>
+          <a:prstGeom prst="line">
+            <a:avLst/>
+          </a:prstGeom>
+          <a:ln w="28575">
+            <a:solidFill>
+              <a:schemeClr val="tx1"/>
+            </a:solidFill>
+          </a:ln>
+        </p:spPr>
+        <p:style>
+          <a:lnRef idx="1">
+            <a:schemeClr val="accent1"/>
+          </a:lnRef>
+          <a:fillRef idx="0">
+            <a:schemeClr val="accent1"/>
+          </a:fillRef>
+          <a:effectRef idx="0">
+            <a:schemeClr val="accent1"/>
+          </a:effectRef>
+          <a:fontRef idx="minor">
+            <a:schemeClr val="tx1"/>
+          </a:fontRef>
+        </p:style>
+      </p:cxnSp>
+      <p:cxnSp>
+        <p:nvCxnSpPr>
+          <p:cNvPr id="43" name="Straight Connector 42"/>
+          <p:cNvCxnSpPr/>
+          <p:nvPr/>
+        </p:nvCxnSpPr>
+        <p:spPr>
+          <a:xfrm>
+            <a:off x="8737697" y="3788465"/>
+            <a:ext cx="601566" cy="450160"/>
+          </a:xfrm>
+          <a:prstGeom prst="line">
+            <a:avLst/>
+          </a:prstGeom>
+          <a:ln w="28575">
+            <a:solidFill>
+              <a:schemeClr val="tx1"/>
+            </a:solidFill>
+          </a:ln>
+        </p:spPr>
+        <p:style>
+          <a:lnRef idx="1">
+            <a:schemeClr val="accent1"/>
+          </a:lnRef>
+          <a:fillRef idx="0">
+            <a:schemeClr val="accent1"/>
+          </a:fillRef>
+          <a:effectRef idx="0">
+            <a:schemeClr val="accent1"/>
+          </a:effectRef>
+          <a:fontRef idx="minor">
+            <a:schemeClr val="tx1"/>
+          </a:fontRef>
+        </p:style>
+      </p:cxnSp>
+      <p:cxnSp>
+        <p:nvCxnSpPr>
+          <p:cNvPr id="44" name="Straight Connector 43"/>
+          <p:cNvCxnSpPr>
+            <a:endCxn id="12" idx="2"/>
+          </p:cNvCxnSpPr>
+          <p:nvPr/>
+        </p:nvCxnSpPr>
+        <p:spPr>
+          <a:xfrm>
+            <a:off x="8370985" y="4255190"/>
+            <a:ext cx="367498" cy="841596"/>
+          </a:xfrm>
+          <a:prstGeom prst="line">
+            <a:avLst/>
+          </a:prstGeom>
+          <a:ln w="28575">
+            <a:solidFill>
+              <a:schemeClr val="tx1"/>
+            </a:solidFill>
+          </a:ln>
+        </p:spPr>
+        <p:style>
+          <a:lnRef idx="1">
+            <a:schemeClr val="accent1"/>
+          </a:lnRef>
+          <a:fillRef idx="0">
+            <a:schemeClr val="accent1"/>
+          </a:fillRef>
+          <a:effectRef idx="0">
+            <a:schemeClr val="accent1"/>
+          </a:effectRef>
+          <a:fontRef idx="minor">
+            <a:schemeClr val="tx1"/>
+          </a:fontRef>
+        </p:style>
+      </p:cxnSp>
+      <p:cxnSp>
+        <p:nvCxnSpPr>
+          <p:cNvPr id="47" name="Straight Connector 46"/>
+          <p:cNvCxnSpPr/>
+          <p:nvPr/>
+        </p:nvCxnSpPr>
+        <p:spPr>
+          <a:xfrm flipH="1">
+            <a:off x="8001000" y="4207565"/>
+            <a:ext cx="122335" cy="769248"/>
+          </a:xfrm>
+          <a:prstGeom prst="line">
+            <a:avLst/>
+          </a:prstGeom>
+          <a:ln w="28575">
+            <a:solidFill>
+              <a:schemeClr val="tx1"/>
+            </a:solidFill>
+          </a:ln>
+        </p:spPr>
+        <p:style>
+          <a:lnRef idx="1">
+            <a:schemeClr val="accent1"/>
+          </a:lnRef>
+          <a:fillRef idx="0">
+            <a:schemeClr val="accent1"/>
+          </a:fillRef>
+          <a:effectRef idx="0">
+            <a:schemeClr val="accent1"/>
+          </a:effectRef>
+          <a:fontRef idx="minor">
+            <a:schemeClr val="tx1"/>
+          </a:fontRef>
+        </p:style>
+      </p:cxnSp>
+      <p:cxnSp>
+        <p:nvCxnSpPr>
+          <p:cNvPr id="49" name="Straight Connector 48"/>
+          <p:cNvCxnSpPr/>
+          <p:nvPr/>
+        </p:nvCxnSpPr>
+        <p:spPr>
+          <a:xfrm flipH="1">
+            <a:off x="7191376" y="4052888"/>
+            <a:ext cx="147637" cy="781050"/>
+          </a:xfrm>
+          <a:prstGeom prst="line">
+            <a:avLst/>
+          </a:prstGeom>
+          <a:ln w="28575">
+            <a:solidFill>
+              <a:schemeClr val="tx1"/>
+            </a:solidFill>
+          </a:ln>
+        </p:spPr>
+        <p:style>
+          <a:lnRef idx="1">
+            <a:schemeClr val="accent1"/>
+          </a:lnRef>
+          <a:fillRef idx="0">
+            <a:schemeClr val="accent1"/>
+          </a:fillRef>
+          <a:effectRef idx="0">
+            <a:schemeClr val="accent1"/>
+          </a:effectRef>
+          <a:fontRef idx="minor">
+            <a:schemeClr val="tx1"/>
+          </a:fontRef>
+        </p:style>
+      </p:cxnSp>
+      <p:cxnSp>
+        <p:nvCxnSpPr>
+          <p:cNvPr id="51" name="Straight Connector 50"/>
+          <p:cNvCxnSpPr/>
+          <p:nvPr/>
+        </p:nvCxnSpPr>
+        <p:spPr>
+          <a:xfrm flipH="1">
+            <a:off x="6791326" y="3976688"/>
+            <a:ext cx="147637" cy="781050"/>
+          </a:xfrm>
+          <a:prstGeom prst="line">
+            <a:avLst/>
+          </a:prstGeom>
+          <a:ln w="28575">
+            <a:solidFill>
+              <a:schemeClr val="tx1"/>
+            </a:solidFill>
+          </a:ln>
+        </p:spPr>
+        <p:style>
+          <a:lnRef idx="1">
+            <a:schemeClr val="accent1"/>
+          </a:lnRef>
+          <a:fillRef idx="0">
+            <a:schemeClr val="accent1"/>
+          </a:fillRef>
+          <a:effectRef idx="0">
+            <a:schemeClr val="accent1"/>
+          </a:effectRef>
+          <a:fontRef idx="minor">
+            <a:schemeClr val="tx1"/>
+          </a:fontRef>
+        </p:style>
+      </p:cxnSp>
+      <p:cxnSp>
+        <p:nvCxnSpPr>
+          <p:cNvPr id="52" name="Straight Connector 51"/>
+          <p:cNvCxnSpPr/>
+          <p:nvPr/>
+        </p:nvCxnSpPr>
+        <p:spPr>
+          <a:xfrm flipH="1">
+            <a:off x="6381751" y="3910013"/>
+            <a:ext cx="147637" cy="781050"/>
+          </a:xfrm>
+          <a:prstGeom prst="line">
+            <a:avLst/>
+          </a:prstGeom>
+          <a:ln w="28575">
+            <a:solidFill>
+              <a:schemeClr val="tx1"/>
+            </a:solidFill>
+          </a:ln>
+        </p:spPr>
+        <p:style>
+          <a:lnRef idx="1">
+            <a:schemeClr val="accent1"/>
+          </a:lnRef>
+          <a:fillRef idx="0">
+            <a:schemeClr val="accent1"/>
+          </a:fillRef>
+          <a:effectRef idx="0">
+            <a:schemeClr val="accent1"/>
+          </a:effectRef>
+          <a:fontRef idx="minor">
+            <a:schemeClr val="tx1"/>
+          </a:fontRef>
+        </p:style>
+      </p:cxnSp>
+      <p:cxnSp>
+        <p:nvCxnSpPr>
+          <p:cNvPr id="53" name="Straight Connector 52"/>
+          <p:cNvCxnSpPr/>
+          <p:nvPr/>
+        </p:nvCxnSpPr>
+        <p:spPr>
+          <a:xfrm flipH="1">
+            <a:off x="5557839" y="3771901"/>
+            <a:ext cx="147637" cy="781050"/>
+          </a:xfrm>
+          <a:prstGeom prst="line">
+            <a:avLst/>
+          </a:prstGeom>
+          <a:ln w="28575">
+            <a:solidFill>
+              <a:schemeClr val="tx1"/>
+            </a:solidFill>
+          </a:ln>
+        </p:spPr>
+        <p:style>
+          <a:lnRef idx="1">
+            <a:schemeClr val="accent1"/>
+          </a:lnRef>
+          <a:fillRef idx="0">
+            <a:schemeClr val="accent1"/>
+          </a:fillRef>
+          <a:effectRef idx="0">
+            <a:schemeClr val="accent1"/>
+          </a:effectRef>
+          <a:fontRef idx="minor">
+            <a:schemeClr val="tx1"/>
+          </a:fontRef>
+        </p:style>
+      </p:cxnSp>
+      <p:cxnSp>
+        <p:nvCxnSpPr>
+          <p:cNvPr id="54" name="Straight Connector 53"/>
+          <p:cNvCxnSpPr/>
+          <p:nvPr/>
+        </p:nvCxnSpPr>
+        <p:spPr>
+          <a:xfrm flipH="1">
+            <a:off x="5143501" y="3690939"/>
+            <a:ext cx="147637" cy="781050"/>
+          </a:xfrm>
+          <a:prstGeom prst="line">
+            <a:avLst/>
+          </a:prstGeom>
+          <a:ln w="28575">
+            <a:solidFill>
+              <a:schemeClr val="tx1"/>
+            </a:solidFill>
+          </a:ln>
+        </p:spPr>
+        <p:style>
+          <a:lnRef idx="1">
+            <a:schemeClr val="accent1"/>
+          </a:lnRef>
+          <a:fillRef idx="0">
+            <a:schemeClr val="accent1"/>
+          </a:fillRef>
+          <a:effectRef idx="0">
+            <a:schemeClr val="accent1"/>
+          </a:effectRef>
+          <a:fontRef idx="minor">
+            <a:schemeClr val="tx1"/>
+          </a:fontRef>
+        </p:style>
+      </p:cxnSp>
+      <p:cxnSp>
+        <p:nvCxnSpPr>
+          <p:cNvPr id="55" name="Straight Connector 54"/>
+          <p:cNvCxnSpPr/>
+          <p:nvPr/>
+        </p:nvCxnSpPr>
+        <p:spPr>
+          <a:xfrm flipH="1">
+            <a:off x="4714877" y="3605213"/>
+            <a:ext cx="152398" cy="814388"/>
+          </a:xfrm>
+          <a:prstGeom prst="line">
+            <a:avLst/>
+          </a:prstGeom>
+          <a:ln w="28575">
+            <a:solidFill>
+              <a:schemeClr val="tx1"/>
+            </a:solidFill>
+          </a:ln>
+        </p:spPr>
+        <p:style>
+          <a:lnRef idx="1">
+            <a:schemeClr val="accent1"/>
+          </a:lnRef>
+          <a:fillRef idx="0">
+            <a:schemeClr val="accent1"/>
+          </a:fillRef>
+          <a:effectRef idx="0">
+            <a:schemeClr val="accent1"/>
+          </a:effectRef>
+          <a:fontRef idx="minor">
+            <a:schemeClr val="tx1"/>
+          </a:fontRef>
+        </p:style>
+      </p:cxnSp>
+      <p:cxnSp>
+        <p:nvCxnSpPr>
+          <p:cNvPr id="56" name="Straight Connector 55"/>
+          <p:cNvCxnSpPr/>
+          <p:nvPr/>
+        </p:nvCxnSpPr>
+        <p:spPr>
+          <a:xfrm flipH="1">
+            <a:off x="3848102" y="3438525"/>
+            <a:ext cx="152398" cy="828676"/>
+          </a:xfrm>
+          <a:prstGeom prst="line">
+            <a:avLst/>
+          </a:prstGeom>
+          <a:ln w="28575">
+            <a:solidFill>
+              <a:schemeClr val="tx1"/>
+            </a:solidFill>
+          </a:ln>
+        </p:spPr>
+        <p:style>
+          <a:lnRef idx="1">
+            <a:schemeClr val="accent1"/>
+          </a:lnRef>
+          <a:fillRef idx="0">
+            <a:schemeClr val="accent1"/>
+          </a:fillRef>
+          <a:effectRef idx="0">
+            <a:schemeClr val="accent1"/>
+          </a:effectRef>
+          <a:fontRef idx="minor">
+            <a:schemeClr val="tx1"/>
+          </a:fontRef>
+        </p:style>
+      </p:cxnSp>
+      <p:cxnSp>
+        <p:nvCxnSpPr>
+          <p:cNvPr id="59" name="Straight Connector 58"/>
+          <p:cNvCxnSpPr/>
+          <p:nvPr/>
+        </p:nvCxnSpPr>
+        <p:spPr>
+          <a:xfrm flipH="1">
+            <a:off x="2957514" y="3295650"/>
+            <a:ext cx="152398" cy="828676"/>
+          </a:xfrm>
+          <a:prstGeom prst="line">
+            <a:avLst/>
+          </a:prstGeom>
+          <a:ln w="28575">
+            <a:solidFill>
+              <a:schemeClr val="tx1"/>
+            </a:solidFill>
+          </a:ln>
+        </p:spPr>
+        <p:style>
+          <a:lnRef idx="1">
+            <a:schemeClr val="accent1"/>
+          </a:lnRef>
+          <a:fillRef idx="0">
+            <a:schemeClr val="accent1"/>
+          </a:fillRef>
+          <a:effectRef idx="0">
+            <a:schemeClr val="accent1"/>
+          </a:effectRef>
+          <a:fontRef idx="minor">
+            <a:schemeClr val="tx1"/>
+          </a:fontRef>
+        </p:style>
+      </p:cxnSp>
+      <p:cxnSp>
+        <p:nvCxnSpPr>
+          <p:cNvPr id="60" name="Straight Connector 59"/>
+          <p:cNvCxnSpPr>
+            <a:stCxn id="13" idx="1"/>
+          </p:cNvCxnSpPr>
+          <p:nvPr/>
+        </p:nvCxnSpPr>
+        <p:spPr>
+          <a:xfrm flipH="1" flipV="1">
+            <a:off x="2062163" y="2852738"/>
+            <a:ext cx="800307" cy="327784"/>
+          </a:xfrm>
+          <a:prstGeom prst="line">
+            <a:avLst/>
+          </a:prstGeom>
+          <a:ln w="28575">
+            <a:solidFill>
+              <a:schemeClr val="tx1"/>
+            </a:solidFill>
+          </a:ln>
+        </p:spPr>
+        <p:style>
+          <a:lnRef idx="1">
+            <a:schemeClr val="accent1"/>
+          </a:lnRef>
+          <a:fillRef idx="0">
+            <a:schemeClr val="accent1"/>
+          </a:fillRef>
+          <a:effectRef idx="0">
+            <a:schemeClr val="accent1"/>
+          </a:effectRef>
+          <a:fontRef idx="minor">
+            <a:schemeClr val="tx1"/>
+          </a:fontRef>
+        </p:style>
+      </p:cxnSp>
+      <p:cxnSp>
+        <p:nvCxnSpPr>
+          <p:cNvPr id="63" name="Straight Connector 62"/>
+          <p:cNvCxnSpPr/>
+          <p:nvPr/>
+        </p:nvCxnSpPr>
+        <p:spPr>
+          <a:xfrm flipH="1" flipV="1">
+            <a:off x="2224088" y="2452688"/>
+            <a:ext cx="800307" cy="327784"/>
+          </a:xfrm>
+          <a:prstGeom prst="line">
+            <a:avLst/>
+          </a:prstGeom>
+          <a:ln w="28575">
+            <a:solidFill>
+              <a:schemeClr val="tx1"/>
+            </a:solidFill>
+          </a:ln>
+        </p:spPr>
+        <p:style>
+          <a:lnRef idx="1">
+            <a:schemeClr val="accent1"/>
+          </a:lnRef>
+          <a:fillRef idx="0">
+            <a:schemeClr val="accent1"/>
+          </a:fillRef>
+          <a:effectRef idx="0">
+            <a:schemeClr val="accent1"/>
+          </a:effectRef>
+          <a:fontRef idx="minor">
+            <a:schemeClr val="tx1"/>
+          </a:fontRef>
+        </p:style>
+      </p:cxnSp>
+      <p:cxnSp>
+        <p:nvCxnSpPr>
+          <p:cNvPr id="64" name="Straight Connector 63"/>
+          <p:cNvCxnSpPr/>
+          <p:nvPr/>
+        </p:nvCxnSpPr>
+        <p:spPr>
+          <a:xfrm flipH="1" flipV="1">
+            <a:off x="2400300" y="2047876"/>
+            <a:ext cx="800307" cy="327784"/>
+          </a:xfrm>
+          <a:prstGeom prst="line">
+            <a:avLst/>
+          </a:prstGeom>
+          <a:ln w="28575">
+            <a:solidFill>
+              <a:schemeClr val="tx1"/>
+            </a:solidFill>
+          </a:ln>
+        </p:spPr>
+        <p:style>
+          <a:lnRef idx="1">
+            <a:schemeClr val="accent1"/>
+          </a:lnRef>
+          <a:fillRef idx="0">
+            <a:schemeClr val="accent1"/>
+          </a:fillRef>
+          <a:effectRef idx="0">
+            <a:schemeClr val="accent1"/>
+          </a:effectRef>
+          <a:fontRef idx="minor">
+            <a:schemeClr val="tx1"/>
+          </a:fontRef>
+        </p:style>
+      </p:cxnSp>
+      <p:sp>
+        <p:nvSpPr>
+          <p:cNvPr id="67" name="Freeform 66"/>
+          <p:cNvSpPr/>
+          <p:nvPr/>
+        </p:nvSpPr>
+        <p:spPr>
+          <a:xfrm>
+            <a:off x="4095750" y="2452688"/>
+            <a:ext cx="857250" cy="852487"/>
+          </a:xfrm>
+          <a:custGeom>
+            <a:avLst/>
+            <a:gdLst>
+              <a:gd name="connsiteX0" fmla="*/ 123825 w 857250"/>
+              <a:gd name="connsiteY0" fmla="*/ 0 h 852487"/>
+              <a:gd name="connsiteX1" fmla="*/ 0 w 857250"/>
+              <a:gd name="connsiteY1" fmla="*/ 728662 h 852487"/>
+              <a:gd name="connsiteX2" fmla="*/ 742950 w 857250"/>
+              <a:gd name="connsiteY2" fmla="*/ 852487 h 852487"/>
+              <a:gd name="connsiteX3" fmla="*/ 857250 w 857250"/>
+              <a:gd name="connsiteY3" fmla="*/ 147637 h 852487"/>
+              <a:gd name="connsiteX4" fmla="*/ 123825 w 857250"/>
+              <a:gd name="connsiteY4" fmla="*/ 0 h 852487"/>
+            </a:gdLst>
+            <a:ahLst/>
+            <a:cxnLst>
+              <a:cxn ang="0">
+                <a:pos x="connsiteX0" y="connsiteY0"/>
+              </a:cxn>
+              <a:cxn ang="0">
+                <a:pos x="connsiteX1" y="connsiteY1"/>
+              </a:cxn>
+              <a:cxn ang="0">
+                <a:pos x="connsiteX2" y="connsiteY2"/>
+              </a:cxn>
+              <a:cxn ang="0">
+                <a:pos x="connsiteX3" y="connsiteY3"/>
+              </a:cxn>
+              <a:cxn ang="0">
+                <a:pos x="connsiteX4" y="connsiteY4"/>
+              </a:cxn>
+            </a:cxnLst>
+            <a:rect l="l" t="t" r="r" b="b"/>
+            <a:pathLst>
+              <a:path w="857250" h="852487">
+                <a:moveTo>
+                  <a:pt x="123825" y="0"/>
+                </a:moveTo>
+                <a:lnTo>
+                  <a:pt x="0" y="728662"/>
+                </a:lnTo>
+                <a:lnTo>
+                  <a:pt x="742950" y="852487"/>
+                </a:lnTo>
+                <a:lnTo>
+                  <a:pt x="857250" y="147637"/>
+                </a:lnTo>
+                <a:lnTo>
+                  <a:pt x="123825" y="0"/>
+                </a:lnTo>
+                <a:close/>
+              </a:path>
+            </a:pathLst>
+          </a:custGeom>
+          <a:noFill/>
+          <a:ln w="28575">
+            <a:solidFill>
+              <a:schemeClr val="tx1"/>
+            </a:solidFill>
+          </a:ln>
+        </p:spPr>
+        <p:style>
+          <a:lnRef idx="2">
+            <a:schemeClr val="accent1">
+              <a:shade val="50000"/>
+            </a:schemeClr>
+          </a:lnRef>
+          <a:fillRef idx="1">
+            <a:schemeClr val="accent1"/>
+          </a:fillRef>
+          <a:effectRef idx="0">
+            <a:schemeClr val="accent1"/>
+          </a:effectRef>
+          <a:fontRef idx="minor">
+            <a:schemeClr val="lt1"/>
+          </a:fontRef>
+        </p:style>
+        <p:txBody>
+          <a:bodyPr rot="0" spcFirstLastPara="0" vertOverflow="overflow" horzOverflow="overflow" vert="horz" wrap="square" lIns="91440" tIns="45720" rIns="91440" bIns="45720" numCol="1" spcCol="0" rtlCol="0" fromWordArt="0" anchor="ctr" anchorCtr="0" forceAA="0" compatLnSpc="1">
+            <a:prstTxWarp prst="textNoShape">
+              <a:avLst/>
+            </a:prstTxWarp>
+            <a:noAutofit/>
+          </a:bodyPr>
+          <a:lstStyle/>
+          <a:p>
+            <a:pPr algn="ctr"/>
+            <a:endParaRPr lang="en-US"/>
+          </a:p>
+        </p:txBody>
+      </p:sp>
+      <p:sp>
+        <p:nvSpPr>
+          <p:cNvPr id="69" name="Freeform 68"/>
+          <p:cNvSpPr/>
+          <p:nvPr/>
+        </p:nvSpPr>
+        <p:spPr>
+          <a:xfrm>
+            <a:off x="5010150" y="2633663"/>
+            <a:ext cx="2314575" cy="1114425"/>
+          </a:xfrm>
+          <a:custGeom>
+            <a:avLst/>
+            <a:gdLst>
+              <a:gd name="connsiteX0" fmla="*/ 128588 w 2314575"/>
+              <a:gd name="connsiteY0" fmla="*/ 0 h 1114425"/>
+              <a:gd name="connsiteX1" fmla="*/ 0 w 2314575"/>
+              <a:gd name="connsiteY1" fmla="*/ 723900 h 1114425"/>
+              <a:gd name="connsiteX2" fmla="*/ 2185988 w 2314575"/>
+              <a:gd name="connsiteY2" fmla="*/ 1114425 h 1114425"/>
+              <a:gd name="connsiteX3" fmla="*/ 2314575 w 2314575"/>
+              <a:gd name="connsiteY3" fmla="*/ 423862 h 1114425"/>
+              <a:gd name="connsiteX4" fmla="*/ 128588 w 2314575"/>
+              <a:gd name="connsiteY4" fmla="*/ 0 h 1114425"/>
+            </a:gdLst>
+            <a:ahLst/>
+            <a:cxnLst>
+              <a:cxn ang="0">
+                <a:pos x="connsiteX0" y="connsiteY0"/>
+              </a:cxn>
+              <a:cxn ang="0">
+                <a:pos x="connsiteX1" y="connsiteY1"/>
+              </a:cxn>
+              <a:cxn ang="0">
+                <a:pos x="connsiteX2" y="connsiteY2"/>
+              </a:cxn>
+              <a:cxn ang="0">
+                <a:pos x="connsiteX3" y="connsiteY3"/>
+              </a:cxn>
+              <a:cxn ang="0">
+                <a:pos x="connsiteX4" y="connsiteY4"/>
+              </a:cxn>
+            </a:cxnLst>
+            <a:rect l="l" t="t" r="r" b="b"/>
+            <a:pathLst>
+              <a:path w="2314575" h="1114425">
+                <a:moveTo>
+                  <a:pt x="128588" y="0"/>
+                </a:moveTo>
+                <a:lnTo>
+                  <a:pt x="0" y="723900"/>
+                </a:lnTo>
+                <a:lnTo>
+                  <a:pt x="2185988" y="1114425"/>
+                </a:lnTo>
+                <a:lnTo>
+                  <a:pt x="2314575" y="423862"/>
+                </a:lnTo>
+                <a:lnTo>
+                  <a:pt x="128588" y="0"/>
+                </a:lnTo>
+                <a:close/>
+              </a:path>
+            </a:pathLst>
+          </a:custGeom>
+          <a:noFill/>
+          <a:ln w="28575">
+            <a:solidFill>
+              <a:schemeClr val="tx1"/>
+            </a:solidFill>
+          </a:ln>
+        </p:spPr>
+        <p:style>
+          <a:lnRef idx="2">
+            <a:schemeClr val="accent1">
+              <a:shade val="50000"/>
+            </a:schemeClr>
+          </a:lnRef>
+          <a:fillRef idx="1">
+            <a:schemeClr val="accent1"/>
+          </a:fillRef>
+          <a:effectRef idx="0">
+            <a:schemeClr val="accent1"/>
+          </a:effectRef>
+          <a:fontRef idx="minor">
+            <a:schemeClr val="lt1"/>
+          </a:fontRef>
+        </p:style>
+        <p:txBody>
+          <a:bodyPr rot="0" spcFirstLastPara="0" vertOverflow="overflow" horzOverflow="overflow" vert="horz" wrap="square" lIns="91440" tIns="45720" rIns="91440" bIns="45720" numCol="1" spcCol="0" rtlCol="0" fromWordArt="0" anchor="ctr" anchorCtr="0" forceAA="0" compatLnSpc="1">
+            <a:prstTxWarp prst="textNoShape">
+              <a:avLst/>
+            </a:prstTxWarp>
+            <a:noAutofit/>
+          </a:bodyPr>
+          <a:lstStyle/>
+          <a:p>
+            <a:pPr algn="ctr"/>
+            <a:endParaRPr lang="en-US"/>
+          </a:p>
+        </p:txBody>
+      </p:sp>
+      <p:sp>
+        <p:nvSpPr>
+          <p:cNvPr id="70" name="Freeform 69"/>
+          <p:cNvSpPr/>
+          <p:nvPr/>
+        </p:nvSpPr>
+        <p:spPr>
+          <a:xfrm>
+            <a:off x="7362825" y="3076575"/>
+            <a:ext cx="795338" cy="828675"/>
+          </a:xfrm>
+          <a:custGeom>
+            <a:avLst/>
+            <a:gdLst>
+              <a:gd name="connsiteX0" fmla="*/ 123825 w 795338"/>
+              <a:gd name="connsiteY0" fmla="*/ 0 h 828675"/>
+              <a:gd name="connsiteX1" fmla="*/ 0 w 795338"/>
+              <a:gd name="connsiteY1" fmla="*/ 709613 h 828675"/>
+              <a:gd name="connsiteX2" fmla="*/ 671513 w 795338"/>
+              <a:gd name="connsiteY2" fmla="*/ 828675 h 828675"/>
+              <a:gd name="connsiteX3" fmla="*/ 795338 w 795338"/>
+              <a:gd name="connsiteY3" fmla="*/ 152400 h 828675"/>
+              <a:gd name="connsiteX4" fmla="*/ 123825 w 795338"/>
+              <a:gd name="connsiteY4" fmla="*/ 0 h 828675"/>
+            </a:gdLst>
+            <a:ahLst/>
+            <a:cxnLst>
+              <a:cxn ang="0">
+                <a:pos x="connsiteX0" y="connsiteY0"/>
+              </a:cxn>
+              <a:cxn ang="0">
+                <a:pos x="connsiteX1" y="connsiteY1"/>
+              </a:cxn>
+              <a:cxn ang="0">
+                <a:pos x="connsiteX2" y="connsiteY2"/>
+              </a:cxn>
+              <a:cxn ang="0">
+                <a:pos x="connsiteX3" y="connsiteY3"/>
+              </a:cxn>
+              <a:cxn ang="0">
+                <a:pos x="connsiteX4" y="connsiteY4"/>
+              </a:cxn>
+            </a:cxnLst>
+            <a:rect l="l" t="t" r="r" b="b"/>
+            <a:pathLst>
+              <a:path w="795338" h="828675">
+                <a:moveTo>
+                  <a:pt x="123825" y="0"/>
+                </a:moveTo>
+                <a:lnTo>
+                  <a:pt x="0" y="709613"/>
+                </a:lnTo>
+                <a:lnTo>
+                  <a:pt x="671513" y="828675"/>
+                </a:lnTo>
+                <a:lnTo>
+                  <a:pt x="795338" y="152400"/>
+                </a:lnTo>
+                <a:lnTo>
+                  <a:pt x="123825" y="0"/>
+                </a:lnTo>
+                <a:close/>
+              </a:path>
+            </a:pathLst>
+          </a:custGeom>
+          <a:noFill/>
+          <a:ln w="28575">
+            <a:solidFill>
+              <a:schemeClr val="tx1"/>
+            </a:solidFill>
+          </a:ln>
+        </p:spPr>
+        <p:style>
+          <a:lnRef idx="2">
+            <a:schemeClr val="accent1">
+              <a:shade val="50000"/>
+            </a:schemeClr>
+          </a:lnRef>
+          <a:fillRef idx="1">
+            <a:schemeClr val="accent1"/>
+          </a:fillRef>
+          <a:effectRef idx="0">
+            <a:schemeClr val="accent1"/>
+          </a:effectRef>
+          <a:fontRef idx="minor">
+            <a:schemeClr val="lt1"/>
+          </a:fontRef>
+        </p:style>
+        <p:txBody>
+          <a:bodyPr rot="0" spcFirstLastPara="0" vertOverflow="overflow" horzOverflow="overflow" vert="horz" wrap="square" lIns="91440" tIns="45720" rIns="91440" bIns="45720" numCol="1" spcCol="0" rtlCol="0" fromWordArt="0" anchor="ctr" anchorCtr="0" forceAA="0" compatLnSpc="1">
+            <a:prstTxWarp prst="textNoShape">
+              <a:avLst/>
+            </a:prstTxWarp>
+            <a:noAutofit/>
+          </a:bodyPr>
+          <a:lstStyle/>
+          <a:p>
+            <a:pPr algn="ctr"/>
+            <a:endParaRPr lang="en-US"/>
+          </a:p>
+        </p:txBody>
+      </p:sp>
+      <p:sp>
+        <p:nvSpPr>
+          <p:cNvPr id="2" name="TextBox 1"/>
+          <p:cNvSpPr txBox="1"/>
+          <p:nvPr/>
+        </p:nvSpPr>
+        <p:spPr>
+          <a:xfrm>
+            <a:off x="1914525" y="4010025"/>
+            <a:ext cx="668773" cy="369332"/>
+          </a:xfrm>
+          <a:prstGeom prst="rect">
+            <a:avLst/>
+          </a:prstGeom>
+          <a:noFill/>
+        </p:spPr>
+        <p:txBody>
+          <a:bodyPr wrap="none" rtlCol="0">
+            <a:spAutoFit/>
+          </a:bodyPr>
+          <a:lstStyle/>
+          <a:p>
+            <a:r>
+              <a:rPr lang="en-US" dirty="0" smtClean="0"/>
+              <a:t>A101</a:t>
+            </a:r>
+            <a:endParaRPr lang="en-US" dirty="0"/>
+          </a:p>
+        </p:txBody>
+      </p:sp>
+      <p:sp>
+        <p:nvSpPr>
+          <p:cNvPr id="39" name="TextBox 38"/>
+          <p:cNvSpPr txBox="1"/>
+          <p:nvPr/>
+        </p:nvSpPr>
+        <p:spPr>
+          <a:xfrm>
+            <a:off x="3057525" y="4191000"/>
+            <a:ext cx="668773" cy="369332"/>
+          </a:xfrm>
+          <a:prstGeom prst="rect">
+            <a:avLst/>
+          </a:prstGeom>
+          <a:noFill/>
+        </p:spPr>
+        <p:txBody>
+          <a:bodyPr wrap="none" rtlCol="0">
+            <a:spAutoFit/>
+          </a:bodyPr>
+          <a:lstStyle/>
+          <a:p>
+            <a:r>
+              <a:rPr lang="en-US" dirty="0" smtClean="0"/>
+              <a:t>A102</a:t>
+            </a:r>
+            <a:endParaRPr lang="en-US" dirty="0"/>
+          </a:p>
+        </p:txBody>
+      </p:sp>
+      <p:sp>
+        <p:nvSpPr>
+          <p:cNvPr id="40" name="TextBox 39"/>
+          <p:cNvSpPr txBox="1"/>
+          <p:nvPr/>
+        </p:nvSpPr>
+        <p:spPr>
+          <a:xfrm>
+            <a:off x="3924300" y="4324350"/>
+            <a:ext cx="668773" cy="369332"/>
+          </a:xfrm>
+          <a:prstGeom prst="rect">
+            <a:avLst/>
+          </a:prstGeom>
+          <a:noFill/>
+        </p:spPr>
+        <p:txBody>
+          <a:bodyPr wrap="none" rtlCol="0">
+            <a:spAutoFit/>
+          </a:bodyPr>
+          <a:lstStyle/>
+          <a:p>
+            <a:r>
+              <a:rPr lang="en-US" dirty="0" smtClean="0"/>
+              <a:t>A104</a:t>
+            </a:r>
+            <a:endParaRPr lang="en-US" dirty="0"/>
+          </a:p>
+        </p:txBody>
+      </p:sp>
+      <p:sp>
+        <p:nvSpPr>
+          <p:cNvPr id="42" name="TextBox 41"/>
+          <p:cNvSpPr txBox="1"/>
+          <p:nvPr/>
+        </p:nvSpPr>
+        <p:spPr>
+          <a:xfrm>
+            <a:off x="4543425" y="4400550"/>
+            <a:ext cx="668773" cy="369332"/>
+          </a:xfrm>
+          <a:prstGeom prst="rect">
+            <a:avLst/>
+          </a:prstGeom>
+          <a:noFill/>
+        </p:spPr>
+        <p:txBody>
+          <a:bodyPr wrap="none" rtlCol="0">
+            <a:spAutoFit/>
+          </a:bodyPr>
+          <a:lstStyle/>
+          <a:p>
+            <a:r>
+              <a:rPr lang="en-US" dirty="0" smtClean="0"/>
+              <a:t>A105</a:t>
+            </a:r>
+            <a:endParaRPr lang="en-US" dirty="0"/>
+          </a:p>
+        </p:txBody>
+      </p:sp>
+      <p:sp>
+        <p:nvSpPr>
+          <p:cNvPr id="45" name="TextBox 44"/>
+          <p:cNvSpPr txBox="1"/>
+          <p:nvPr/>
+        </p:nvSpPr>
+        <p:spPr>
+          <a:xfrm>
+            <a:off x="4953000" y="4610100"/>
+            <a:ext cx="668773" cy="369332"/>
+          </a:xfrm>
+          <a:prstGeom prst="rect">
+            <a:avLst/>
+          </a:prstGeom>
+          <a:noFill/>
+        </p:spPr>
+        <p:txBody>
+          <a:bodyPr wrap="none" rtlCol="0">
+            <a:spAutoFit/>
+          </a:bodyPr>
+          <a:lstStyle/>
+          <a:p>
+            <a:r>
+              <a:rPr lang="en-US" dirty="0" smtClean="0"/>
+              <a:t>A106</a:t>
+            </a:r>
+            <a:endParaRPr lang="en-US" dirty="0"/>
+          </a:p>
+        </p:txBody>
+      </p:sp>
+      <p:sp>
+        <p:nvSpPr>
+          <p:cNvPr id="46" name="TextBox 45"/>
+          <p:cNvSpPr txBox="1"/>
+          <p:nvPr/>
+        </p:nvSpPr>
+        <p:spPr>
+          <a:xfrm>
+            <a:off x="5562600" y="4724400"/>
+            <a:ext cx="668773" cy="369332"/>
+          </a:xfrm>
+          <a:prstGeom prst="rect">
+            <a:avLst/>
+          </a:prstGeom>
+          <a:noFill/>
+        </p:spPr>
+        <p:txBody>
+          <a:bodyPr wrap="none" rtlCol="0">
+            <a:spAutoFit/>
+          </a:bodyPr>
+          <a:lstStyle/>
+          <a:p>
+            <a:r>
+              <a:rPr lang="en-US" dirty="0" smtClean="0"/>
+              <a:t>A107</a:t>
+            </a:r>
+            <a:endParaRPr lang="en-US" dirty="0"/>
+          </a:p>
+        </p:txBody>
+      </p:sp>
+      <p:sp>
+        <p:nvSpPr>
+          <p:cNvPr id="48" name="TextBox 47"/>
+          <p:cNvSpPr txBox="1"/>
+          <p:nvPr/>
+        </p:nvSpPr>
+        <p:spPr>
+          <a:xfrm>
+            <a:off x="6219825" y="4933950"/>
+            <a:ext cx="668773" cy="369332"/>
+          </a:xfrm>
+          <a:prstGeom prst="rect">
+            <a:avLst/>
+          </a:prstGeom>
+          <a:noFill/>
+        </p:spPr>
+        <p:txBody>
+          <a:bodyPr wrap="none" rtlCol="0">
+            <a:spAutoFit/>
+          </a:bodyPr>
+          <a:lstStyle/>
+          <a:p>
+            <a:r>
+              <a:rPr lang="en-US" dirty="0" smtClean="0"/>
+              <a:t>A108</a:t>
+            </a:r>
+            <a:endParaRPr lang="en-US" dirty="0"/>
+          </a:p>
+        </p:txBody>
+      </p:sp>
+      <p:sp>
+        <p:nvSpPr>
+          <p:cNvPr id="50" name="TextBox 49"/>
+          <p:cNvSpPr txBox="1"/>
+          <p:nvPr/>
+        </p:nvSpPr>
+        <p:spPr>
+          <a:xfrm>
+            <a:off x="6562725" y="5143500"/>
+            <a:ext cx="668773" cy="369332"/>
+          </a:xfrm>
+          <a:prstGeom prst="rect">
+            <a:avLst/>
+          </a:prstGeom>
+          <a:noFill/>
+        </p:spPr>
+        <p:txBody>
+          <a:bodyPr wrap="none" rtlCol="0">
+            <a:spAutoFit/>
+          </a:bodyPr>
+          <a:lstStyle/>
+          <a:p>
+            <a:r>
+              <a:rPr lang="en-US" dirty="0" smtClean="0"/>
+              <a:t>A109</a:t>
+            </a:r>
+            <a:endParaRPr lang="en-US" dirty="0"/>
+          </a:p>
+        </p:txBody>
+      </p:sp>
+      <p:sp>
+        <p:nvSpPr>
+          <p:cNvPr id="57" name="TextBox 56"/>
+          <p:cNvSpPr txBox="1"/>
+          <p:nvPr/>
+        </p:nvSpPr>
+        <p:spPr>
+          <a:xfrm>
+            <a:off x="7200900" y="4924425"/>
+            <a:ext cx="668773" cy="369332"/>
+          </a:xfrm>
+          <a:prstGeom prst="rect">
+            <a:avLst/>
+          </a:prstGeom>
+          <a:noFill/>
+        </p:spPr>
+        <p:txBody>
+          <a:bodyPr wrap="none" rtlCol="0">
+            <a:spAutoFit/>
+          </a:bodyPr>
+          <a:lstStyle/>
+          <a:p>
+            <a:r>
+              <a:rPr lang="en-US" dirty="0" smtClean="0"/>
+              <a:t>A110</a:t>
+            </a:r>
+            <a:endParaRPr lang="en-US" dirty="0"/>
+          </a:p>
+        </p:txBody>
+      </p:sp>
+      <p:sp>
+        <p:nvSpPr>
+          <p:cNvPr id="58" name="TextBox 57"/>
+          <p:cNvSpPr txBox="1"/>
+          <p:nvPr/>
+        </p:nvSpPr>
+        <p:spPr>
+          <a:xfrm>
+            <a:off x="7953375" y="5048250"/>
+            <a:ext cx="668773" cy="369332"/>
+          </a:xfrm>
+          <a:prstGeom prst="rect">
+            <a:avLst/>
+          </a:prstGeom>
+          <a:noFill/>
+        </p:spPr>
+        <p:txBody>
+          <a:bodyPr wrap="none" rtlCol="0">
+            <a:spAutoFit/>
+          </a:bodyPr>
+          <a:lstStyle/>
+          <a:p>
+            <a:r>
+              <a:rPr lang="en-US" dirty="0" smtClean="0"/>
+              <a:t>A111</a:t>
+            </a:r>
+            <a:endParaRPr lang="en-US" dirty="0"/>
+          </a:p>
+        </p:txBody>
+      </p:sp>
+      <p:sp>
+        <p:nvSpPr>
+          <p:cNvPr id="61" name="TextBox 60"/>
+          <p:cNvSpPr txBox="1"/>
+          <p:nvPr/>
+        </p:nvSpPr>
+        <p:spPr>
+          <a:xfrm>
+            <a:off x="8972550" y="4619625"/>
+            <a:ext cx="668773" cy="369332"/>
+          </a:xfrm>
+          <a:prstGeom prst="rect">
+            <a:avLst/>
+          </a:prstGeom>
+          <a:noFill/>
+        </p:spPr>
+        <p:txBody>
+          <a:bodyPr wrap="none" rtlCol="0">
+            <a:spAutoFit/>
+          </a:bodyPr>
+          <a:lstStyle/>
+          <a:p>
+            <a:r>
+              <a:rPr lang="en-US" dirty="0" smtClean="0"/>
+              <a:t>A112</a:t>
+            </a:r>
+            <a:endParaRPr lang="en-US" dirty="0"/>
+          </a:p>
+        </p:txBody>
+      </p:sp>
+      <p:sp>
+        <p:nvSpPr>
+          <p:cNvPr id="62" name="TextBox 61"/>
+          <p:cNvSpPr txBox="1"/>
+          <p:nvPr/>
+        </p:nvSpPr>
+        <p:spPr>
+          <a:xfrm>
+            <a:off x="9439275" y="4000500"/>
+            <a:ext cx="668773" cy="369332"/>
+          </a:xfrm>
+          <a:prstGeom prst="rect">
+            <a:avLst/>
+          </a:prstGeom>
+          <a:noFill/>
+        </p:spPr>
+        <p:txBody>
+          <a:bodyPr wrap="none" rtlCol="0">
+            <a:spAutoFit/>
+          </a:bodyPr>
+          <a:lstStyle/>
+          <a:p>
+            <a:r>
+              <a:rPr lang="en-US" dirty="0" smtClean="0"/>
+              <a:t>A113</a:t>
+            </a:r>
+            <a:endParaRPr lang="en-US" dirty="0"/>
+          </a:p>
+        </p:txBody>
+      </p:sp>
+      <p:sp>
+        <p:nvSpPr>
+          <p:cNvPr id="65" name="TextBox 64"/>
+          <p:cNvSpPr txBox="1"/>
+          <p:nvPr/>
+        </p:nvSpPr>
+        <p:spPr>
+          <a:xfrm>
+            <a:off x="9648825" y="3648075"/>
+            <a:ext cx="668773" cy="369332"/>
+          </a:xfrm>
+          <a:prstGeom prst="rect">
+            <a:avLst/>
+          </a:prstGeom>
+          <a:noFill/>
+        </p:spPr>
+        <p:txBody>
+          <a:bodyPr wrap="none" rtlCol="0">
+            <a:spAutoFit/>
+          </a:bodyPr>
+          <a:lstStyle/>
+          <a:p>
+            <a:r>
+              <a:rPr lang="en-US" dirty="0" smtClean="0"/>
+              <a:t>A114</a:t>
+            </a:r>
+            <a:endParaRPr lang="en-US" dirty="0"/>
+          </a:p>
+        </p:txBody>
+      </p:sp>
+      <p:sp>
+        <p:nvSpPr>
+          <p:cNvPr id="66" name="TextBox 65"/>
+          <p:cNvSpPr txBox="1"/>
+          <p:nvPr/>
+        </p:nvSpPr>
+        <p:spPr>
+          <a:xfrm>
+            <a:off x="9629775" y="2057400"/>
+            <a:ext cx="668773" cy="369332"/>
+          </a:xfrm>
+          <a:prstGeom prst="rect">
+            <a:avLst/>
+          </a:prstGeom>
+          <a:noFill/>
+        </p:spPr>
+        <p:txBody>
+          <a:bodyPr wrap="none" rtlCol="0">
+            <a:spAutoFit/>
+          </a:bodyPr>
+          <a:lstStyle/>
+          <a:p>
+            <a:r>
+              <a:rPr lang="en-US" dirty="0" smtClean="0"/>
+              <a:t>A115</a:t>
+            </a:r>
+            <a:endParaRPr lang="en-US" dirty="0"/>
+          </a:p>
+        </p:txBody>
+      </p:sp>
+      <p:sp>
+        <p:nvSpPr>
+          <p:cNvPr id="68" name="TextBox 67"/>
+          <p:cNvSpPr txBox="1"/>
+          <p:nvPr/>
+        </p:nvSpPr>
+        <p:spPr>
+          <a:xfrm>
+            <a:off x="8401050" y="1790700"/>
+            <a:ext cx="668773" cy="369332"/>
+          </a:xfrm>
+          <a:prstGeom prst="rect">
+            <a:avLst/>
+          </a:prstGeom>
+          <a:noFill/>
+        </p:spPr>
+        <p:txBody>
+          <a:bodyPr wrap="none" rtlCol="0">
+            <a:spAutoFit/>
+          </a:bodyPr>
+          <a:lstStyle/>
+          <a:p>
+            <a:r>
+              <a:rPr lang="en-US" dirty="0" smtClean="0"/>
+              <a:t>A116</a:t>
+            </a:r>
+            <a:endParaRPr lang="en-US" dirty="0"/>
+          </a:p>
+        </p:txBody>
+      </p:sp>
+      <p:sp>
+        <p:nvSpPr>
+          <p:cNvPr id="71" name="TextBox 70"/>
+          <p:cNvSpPr txBox="1"/>
+          <p:nvPr/>
+        </p:nvSpPr>
+        <p:spPr>
+          <a:xfrm>
+            <a:off x="7848600" y="1685925"/>
+            <a:ext cx="668773" cy="369332"/>
+          </a:xfrm>
+          <a:prstGeom prst="rect">
+            <a:avLst/>
+          </a:prstGeom>
+          <a:noFill/>
+        </p:spPr>
+        <p:txBody>
+          <a:bodyPr wrap="none" rtlCol="0">
+            <a:spAutoFit/>
+          </a:bodyPr>
+          <a:lstStyle/>
+          <a:p>
+            <a:r>
+              <a:rPr lang="en-US" dirty="0" smtClean="0"/>
+              <a:t>A117</a:t>
+            </a:r>
+            <a:endParaRPr lang="en-US" dirty="0"/>
+          </a:p>
+        </p:txBody>
+      </p:sp>
+      <p:sp>
+        <p:nvSpPr>
+          <p:cNvPr id="72" name="TextBox 71"/>
+          <p:cNvSpPr txBox="1"/>
+          <p:nvPr/>
+        </p:nvSpPr>
+        <p:spPr>
+          <a:xfrm>
+            <a:off x="7267575" y="1581150"/>
+            <a:ext cx="668773" cy="369332"/>
+          </a:xfrm>
+          <a:prstGeom prst="rect">
+            <a:avLst/>
+          </a:prstGeom>
+          <a:noFill/>
+        </p:spPr>
+        <p:txBody>
+          <a:bodyPr wrap="none" rtlCol="0">
+            <a:spAutoFit/>
+          </a:bodyPr>
+          <a:lstStyle/>
+          <a:p>
+            <a:r>
+              <a:rPr lang="en-US" dirty="0" smtClean="0"/>
+              <a:t>A118</a:t>
+            </a:r>
+            <a:endParaRPr lang="en-US" dirty="0"/>
+          </a:p>
+        </p:txBody>
+      </p:sp>
+      <p:sp>
+        <p:nvSpPr>
+          <p:cNvPr id="73" name="TextBox 72"/>
+          <p:cNvSpPr txBox="1"/>
+          <p:nvPr/>
+        </p:nvSpPr>
+        <p:spPr>
+          <a:xfrm>
+            <a:off x="6819900" y="1504950"/>
+            <a:ext cx="668773" cy="369332"/>
+          </a:xfrm>
+          <a:prstGeom prst="rect">
+            <a:avLst/>
+          </a:prstGeom>
+          <a:noFill/>
+        </p:spPr>
+        <p:txBody>
+          <a:bodyPr wrap="none" rtlCol="0">
+            <a:spAutoFit/>
+          </a:bodyPr>
+          <a:lstStyle/>
+          <a:p>
+            <a:r>
+              <a:rPr lang="en-US" dirty="0" smtClean="0"/>
+              <a:t>A119</a:t>
+            </a:r>
+            <a:endParaRPr lang="en-US" dirty="0"/>
+          </a:p>
+        </p:txBody>
+      </p:sp>
+      <p:sp>
+        <p:nvSpPr>
+          <p:cNvPr id="74" name="TextBox 73"/>
+          <p:cNvSpPr txBox="1"/>
+          <p:nvPr/>
+        </p:nvSpPr>
+        <p:spPr>
+          <a:xfrm>
+            <a:off x="6286500" y="1352550"/>
+            <a:ext cx="668773" cy="369332"/>
+          </a:xfrm>
+          <a:prstGeom prst="rect">
+            <a:avLst/>
+          </a:prstGeom>
+          <a:noFill/>
+        </p:spPr>
+        <p:txBody>
+          <a:bodyPr wrap="none" rtlCol="0">
+            <a:spAutoFit/>
+          </a:bodyPr>
+          <a:lstStyle/>
+          <a:p>
+            <a:r>
+              <a:rPr lang="en-US" dirty="0" smtClean="0"/>
+              <a:t>A120</a:t>
+            </a:r>
+            <a:endParaRPr lang="en-US" dirty="0"/>
+          </a:p>
+        </p:txBody>
+      </p:sp>
+      <p:sp>
+        <p:nvSpPr>
+          <p:cNvPr id="75" name="TextBox 74"/>
+          <p:cNvSpPr txBox="1"/>
+          <p:nvPr/>
+        </p:nvSpPr>
+        <p:spPr>
+          <a:xfrm>
+            <a:off x="5667375" y="1200150"/>
+            <a:ext cx="668773" cy="369332"/>
+          </a:xfrm>
+          <a:prstGeom prst="rect">
+            <a:avLst/>
+          </a:prstGeom>
+          <a:noFill/>
+        </p:spPr>
+        <p:txBody>
+          <a:bodyPr wrap="none" rtlCol="0">
+            <a:spAutoFit/>
+          </a:bodyPr>
+          <a:lstStyle/>
+          <a:p>
+            <a:r>
+              <a:rPr lang="en-US" dirty="0" smtClean="0"/>
+              <a:t>A121</a:t>
+            </a:r>
+            <a:endParaRPr lang="en-US" dirty="0"/>
+          </a:p>
+        </p:txBody>
+      </p:sp>
+      <p:sp>
+        <p:nvSpPr>
+          <p:cNvPr id="76" name="TextBox 75"/>
+          <p:cNvSpPr txBox="1"/>
+          <p:nvPr/>
+        </p:nvSpPr>
+        <p:spPr>
+          <a:xfrm>
+            <a:off x="5076825" y="1133475"/>
+            <a:ext cx="668773" cy="369332"/>
+          </a:xfrm>
+          <a:prstGeom prst="rect">
+            <a:avLst/>
+          </a:prstGeom>
+          <a:noFill/>
+        </p:spPr>
+        <p:txBody>
+          <a:bodyPr wrap="none" rtlCol="0">
+            <a:spAutoFit/>
+          </a:bodyPr>
+          <a:lstStyle/>
+          <a:p>
+            <a:r>
+              <a:rPr lang="en-US" dirty="0" smtClean="0"/>
+              <a:t>A122</a:t>
+            </a:r>
+            <a:endParaRPr lang="en-US" dirty="0"/>
+          </a:p>
+        </p:txBody>
+      </p:sp>
+      <p:sp>
+        <p:nvSpPr>
+          <p:cNvPr id="77" name="TextBox 76"/>
+          <p:cNvSpPr txBox="1"/>
+          <p:nvPr/>
+        </p:nvSpPr>
+        <p:spPr>
+          <a:xfrm>
+            <a:off x="4543425" y="933450"/>
+            <a:ext cx="668773" cy="369332"/>
+          </a:xfrm>
+          <a:prstGeom prst="rect">
+            <a:avLst/>
+          </a:prstGeom>
+          <a:noFill/>
+        </p:spPr>
+        <p:txBody>
+          <a:bodyPr wrap="none" rtlCol="0">
+            <a:spAutoFit/>
+          </a:bodyPr>
+          <a:lstStyle/>
+          <a:p>
+            <a:r>
+              <a:rPr lang="en-US" dirty="0" smtClean="0"/>
+              <a:t>A123</a:t>
+            </a:r>
+            <a:endParaRPr lang="en-US" dirty="0"/>
+          </a:p>
+        </p:txBody>
+      </p:sp>
+      <p:sp>
+        <p:nvSpPr>
+          <p:cNvPr id="78" name="TextBox 77"/>
+          <p:cNvSpPr txBox="1"/>
+          <p:nvPr/>
+        </p:nvSpPr>
+        <p:spPr>
+          <a:xfrm>
+            <a:off x="3905250" y="885825"/>
+            <a:ext cx="668773" cy="369332"/>
+          </a:xfrm>
+          <a:prstGeom prst="rect">
+            <a:avLst/>
+          </a:prstGeom>
+          <a:noFill/>
+        </p:spPr>
+        <p:txBody>
+          <a:bodyPr wrap="none" rtlCol="0">
+            <a:spAutoFit/>
+          </a:bodyPr>
+          <a:lstStyle/>
+          <a:p>
+            <a:r>
+              <a:rPr lang="en-US" dirty="0" smtClean="0"/>
+              <a:t>A124</a:t>
+            </a:r>
+            <a:endParaRPr lang="en-US" dirty="0"/>
+          </a:p>
+        </p:txBody>
+      </p:sp>
+      <p:sp>
+        <p:nvSpPr>
+          <p:cNvPr id="79" name="TextBox 78"/>
+          <p:cNvSpPr txBox="1"/>
+          <p:nvPr/>
+        </p:nvSpPr>
+        <p:spPr>
+          <a:xfrm>
+            <a:off x="2914650" y="657225"/>
+            <a:ext cx="668773" cy="369332"/>
+          </a:xfrm>
+          <a:prstGeom prst="rect">
+            <a:avLst/>
+          </a:prstGeom>
+          <a:noFill/>
+        </p:spPr>
+        <p:txBody>
+          <a:bodyPr wrap="none" rtlCol="0">
+            <a:spAutoFit/>
+          </a:bodyPr>
+          <a:lstStyle/>
+          <a:p>
+            <a:r>
+              <a:rPr lang="en-US" dirty="0" smtClean="0"/>
+              <a:t>A125</a:t>
+            </a:r>
+            <a:endParaRPr lang="en-US" dirty="0"/>
+          </a:p>
+        </p:txBody>
+      </p:sp>
+      <p:sp>
+        <p:nvSpPr>
+          <p:cNvPr id="80" name="TextBox 79"/>
+          <p:cNvSpPr txBox="1"/>
+          <p:nvPr/>
+        </p:nvSpPr>
+        <p:spPr>
+          <a:xfrm>
+            <a:off x="1638300" y="1952625"/>
+            <a:ext cx="668773" cy="369332"/>
+          </a:xfrm>
+          <a:prstGeom prst="rect">
+            <a:avLst/>
+          </a:prstGeom>
+          <a:noFill/>
+        </p:spPr>
+        <p:txBody>
+          <a:bodyPr wrap="none" rtlCol="0">
+            <a:spAutoFit/>
+          </a:bodyPr>
+          <a:lstStyle/>
+          <a:p>
+            <a:r>
+              <a:rPr lang="en-US" dirty="0" smtClean="0"/>
+              <a:t>A126</a:t>
+            </a:r>
+            <a:endParaRPr lang="en-US" dirty="0"/>
+          </a:p>
+        </p:txBody>
+      </p:sp>
+      <p:sp>
+        <p:nvSpPr>
+          <p:cNvPr id="81" name="TextBox 80"/>
+          <p:cNvSpPr txBox="1"/>
+          <p:nvPr/>
+        </p:nvSpPr>
+        <p:spPr>
+          <a:xfrm>
+            <a:off x="1466850" y="2409825"/>
+            <a:ext cx="668773" cy="369332"/>
+          </a:xfrm>
+          <a:prstGeom prst="rect">
+            <a:avLst/>
+          </a:prstGeom>
+          <a:noFill/>
+        </p:spPr>
+        <p:txBody>
+          <a:bodyPr wrap="none" rtlCol="0">
+            <a:spAutoFit/>
+          </a:bodyPr>
+          <a:lstStyle/>
+          <a:p>
+            <a:r>
+              <a:rPr lang="en-US" dirty="0" smtClean="0"/>
+              <a:t>A127</a:t>
+            </a:r>
+            <a:endParaRPr lang="en-US" dirty="0"/>
+          </a:p>
+        </p:txBody>
+      </p:sp>
+    </p:spTree>
+    <p:extLst>
+      <p:ext uri="{BB962C8B-B14F-4D97-AF65-F5344CB8AC3E}">
+        <p14:creationId xmlns:p14="http://schemas.microsoft.com/office/powerpoint/2010/main" val="1151266192"/>
       </p:ext>
     </p:extLst>
   </p:cSld>

</xml_diff>